<commit_message>
Projektikurssiin orientoiva powerpoint muokattu
</commit_message>
<xml_diff>
--- a/06_ohjelmistoarkkitehtuurit_ja_patternit/SoftwareProjects_LessonsLearned.pptx
+++ b/06_ohjelmistoarkkitehtuurit_ja_patternit/SoftwareProjects_LessonsLearned.pptx
@@ -5,7 +5,7 @@
     <p:sldMasterId id="2147483648" r:id="rId4"/>
   </p:sldMasterIdLst>
   <p:notesMasterIdLst>
-    <p:notesMasterId r:id="rId13"/>
+    <p:notesMasterId r:id="rId14"/>
   </p:notesMasterIdLst>
   <p:sldIdLst>
     <p:sldId id="256" r:id="rId5"/>
@@ -15,7 +15,8 @@
     <p:sldId id="275" r:id="rId9"/>
     <p:sldId id="277" r:id="rId10"/>
     <p:sldId id="278" r:id="rId11"/>
-    <p:sldId id="276" r:id="rId12"/>
+    <p:sldId id="279" r:id="rId12"/>
+    <p:sldId id="276" r:id="rId13"/>
   </p:sldIdLst>
   <p:sldSz cx="12192000" cy="6858000"/>
   <p:notesSz cx="6858000" cy="9144000"/>
@@ -8561,7 +8562,7 @@
             <a:pPr lvl="1"/>
             <a:r>
               <a:rPr lang="en-US" dirty="0"/>
-              <a:t>Meeting and file naming</a:t>
+              <a:t>Meeting and file naming. Reactions to someone working at Saturday night.</a:t>
             </a:r>
           </a:p>
           <a:p>
@@ -9464,42 +9465,14 @@
           <a:lstStyle/>
           <a:p>
             <a:r>
-              <a:rPr lang="fi-FI" sz="3500" dirty="0" err="1"/>
-              <a:t>The</a:t>
-            </a:r>
-            <a:r>
-              <a:rPr lang="fi-FI" sz="3500" dirty="0"/>
-              <a:t> long version of </a:t>
-            </a:r>
-            <a:r>
-              <a:rPr lang="fi-FI" sz="3500" dirty="0" err="1"/>
-              <a:t>the</a:t>
-            </a:r>
-            <a:r>
-              <a:rPr lang="fi-FI" sz="3500" dirty="0"/>
-              <a:t> </a:t>
-            </a:r>
-            <a:r>
-              <a:rPr lang="fi-FI" sz="3500" i="1" dirty="0" err="1"/>
-              <a:t>project</a:t>
-            </a:r>
-            <a:r>
-              <a:rPr lang="fi-FI" sz="3500" i="1" dirty="0"/>
-              <a:t> </a:t>
-            </a:r>
-            <a:r>
-              <a:rPr lang="fi-FI" sz="3500" i="1" dirty="0" err="1"/>
-              <a:t>lessons</a:t>
-            </a:r>
-            <a:r>
-              <a:rPr lang="fi-FI" sz="3500" i="1" dirty="0"/>
-              <a:t> </a:t>
-            </a:r>
-            <a:r>
-              <a:rPr lang="fi-FI" sz="3500" i="1" dirty="0" err="1"/>
-              <a:t>learned</a:t>
-            </a:r>
-            <a:endParaRPr lang="fi-FI" sz="3500" i="1" dirty="0"/>
+              <a:rPr lang="fi-FI" sz="3200" dirty="0"/>
+              <a:t>Agile </a:t>
+            </a:r>
+            <a:r>
+              <a:rPr lang="fi-FI" sz="3200" dirty="0" err="1"/>
+              <a:t>documentation</a:t>
+            </a:r>
+            <a:endParaRPr lang="fi-FI" sz="3500" dirty="0"/>
           </a:p>
         </p:txBody>
       </p:sp>
@@ -9533,23 +9506,44 @@
           <a:p>
             <a:r>
               <a:rPr lang="en-US" dirty="0"/>
-              <a:t>Based on experiences from tens (or hundreds if counting thesis projects) of student projects</a:t>
-            </a:r>
-          </a:p>
-          <a:p>
-            <a:r>
-              <a:rPr lang="en-US" dirty="0"/>
-              <a:t>Basically nothing earth shaking, but these things require thinking so that we can avoid these pitfalls from the start.</a:t>
-            </a:r>
-          </a:p>
-          <a:p>
+              <a:t>E.g.</a:t>
+            </a:r>
+          </a:p>
+          <a:p>
+            <a:pPr lvl="1"/>
             <a:r>
               <a:rPr lang="en-US" dirty="0">
                 <a:hlinkClick r:id="rId2"/>
               </a:rPr>
-              <a:t>http://myy.haaga-helia.fi/~valju/perma/sw_project_courses/Software%20Development%20projects.pdf</a:t>
+              <a:t>https://github.com/haagahelia/swd4tn023/blob/master/06_ohjelmistoarkkitehtuurit_ja_patternit/documentation_principles_for_sw_projects.pdf</a:t>
             </a:r>
             <a:endParaRPr lang="en-US" dirty="0"/>
+          </a:p>
+          <a:p>
+            <a:r>
+              <a:rPr lang="en-US" dirty="0"/>
+              <a:t>Read those 8 slides above</a:t>
+            </a:r>
+          </a:p>
+          <a:p>
+            <a:r>
+              <a:rPr lang="en-US" dirty="0"/>
+              <a:t>Also in this important topic we have the non-simple thinking:</a:t>
+            </a:r>
+          </a:p>
+          <a:p>
+            <a:pPr lvl="1"/>
+            <a:r>
+              <a:rPr lang="en-US" dirty="0"/>
+              <a:t>While learning in school we might do heavy documentation, where the process of creating is important</a:t>
+            </a:r>
+          </a:p>
+          <a:p>
+            <a:pPr lvl="1"/>
+            <a:r>
+              <a:rPr lang="en-US" dirty="0"/>
+              <a:t>While doing real project we emphasize maintainability and agility also for documentation    </a:t>
+            </a:r>
           </a:p>
           <a:p>
             <a:pPr lvl="1"/>
@@ -9635,6 +9629,241 @@
             <a:fld id="{76BAB7ED-EDE9-4D4B-9A2D-30E18C47C16E}" type="slidenum">
               <a:rPr lang="en-GB" smtClean="0"/>
               <a:t>8</a:t>
+            </a:fld>
+            <a:endParaRPr lang="en-GB"/>
+          </a:p>
+        </p:txBody>
+      </p:sp>
+    </p:spTree>
+    <p:extLst>
+      <p:ext uri="{BB962C8B-B14F-4D97-AF65-F5344CB8AC3E}">
+        <p14:creationId xmlns:p14="http://schemas.microsoft.com/office/powerpoint/2010/main" val="4255934849"/>
+      </p:ext>
+    </p:extLst>
+  </p:cSld>
+  <p:clrMapOvr>
+    <a:masterClrMapping/>
+  </p:clrMapOvr>
+</p:sld>
+</file>
+
+<file path=ppt/slides/slide9.xml><?xml version="1.0" encoding="utf-8"?>
+<p:sld xmlns:a="http://schemas.openxmlformats.org/drawingml/2006/main" xmlns:r="http://schemas.openxmlformats.org/officeDocument/2006/relationships" xmlns:p="http://schemas.openxmlformats.org/presentationml/2006/main">
+  <p:cSld>
+    <p:spTree>
+      <p:nvGrpSpPr>
+        <p:cNvPr id="1" name=""/>
+        <p:cNvGrpSpPr/>
+        <p:nvPr/>
+      </p:nvGrpSpPr>
+      <p:grpSpPr>
+        <a:xfrm>
+          <a:off x="0" y="0"/>
+          <a:ext cx="0" cy="0"/>
+          <a:chOff x="0" y="0"/>
+          <a:chExt cx="0" cy="0"/>
+        </a:xfrm>
+      </p:grpSpPr>
+      <p:sp>
+        <p:nvSpPr>
+          <p:cNvPr id="8" name="Title 7">
+            <a:extLst>
+              <a:ext uri="{FF2B5EF4-FFF2-40B4-BE49-F238E27FC236}">
+                <a16:creationId xmlns:a16="http://schemas.microsoft.com/office/drawing/2014/main" id="{197044C3-CD23-D844-B780-26FABA91AD0F}"/>
+              </a:ext>
+            </a:extLst>
+          </p:cNvPr>
+          <p:cNvSpPr>
+            <a:spLocks noGrp="1"/>
+          </p:cNvSpPr>
+          <p:nvPr>
+            <p:ph type="title"/>
+          </p:nvPr>
+        </p:nvSpPr>
+        <p:spPr>
+          <a:xfrm>
+            <a:off x="550863" y="549276"/>
+            <a:ext cx="11125200" cy="667342"/>
+          </a:xfrm>
+        </p:spPr>
+        <p:txBody>
+          <a:bodyPr>
+            <a:normAutofit/>
+          </a:bodyPr>
+          <a:lstStyle/>
+          <a:p>
+            <a:r>
+              <a:rPr lang="fi-FI" sz="3500" dirty="0" err="1"/>
+              <a:t>The</a:t>
+            </a:r>
+            <a:r>
+              <a:rPr lang="fi-FI" sz="3500" dirty="0"/>
+              <a:t> long version of </a:t>
+            </a:r>
+            <a:r>
+              <a:rPr lang="fi-FI" sz="3500" dirty="0" err="1"/>
+              <a:t>the</a:t>
+            </a:r>
+            <a:r>
+              <a:rPr lang="fi-FI" sz="3500" dirty="0"/>
+              <a:t> </a:t>
+            </a:r>
+            <a:r>
+              <a:rPr lang="fi-FI" sz="3500" i="1" dirty="0" err="1"/>
+              <a:t>project</a:t>
+            </a:r>
+            <a:r>
+              <a:rPr lang="fi-FI" sz="3500" i="1" dirty="0"/>
+              <a:t> </a:t>
+            </a:r>
+            <a:r>
+              <a:rPr lang="fi-FI" sz="3500" i="1" dirty="0" err="1"/>
+              <a:t>lessons</a:t>
+            </a:r>
+            <a:r>
+              <a:rPr lang="fi-FI" sz="3500" i="1" dirty="0"/>
+              <a:t> </a:t>
+            </a:r>
+            <a:r>
+              <a:rPr lang="fi-FI" sz="3500" i="1" dirty="0" err="1"/>
+              <a:t>learned</a:t>
+            </a:r>
+            <a:endParaRPr lang="fi-FI" sz="3500" i="1" dirty="0"/>
+          </a:p>
+        </p:txBody>
+      </p:sp>
+      <p:sp>
+        <p:nvSpPr>
+          <p:cNvPr id="9" name="Content Placeholder 8">
+            <a:extLst>
+              <a:ext uri="{FF2B5EF4-FFF2-40B4-BE49-F238E27FC236}">
+                <a16:creationId xmlns:a16="http://schemas.microsoft.com/office/drawing/2014/main" id="{ACDE61D8-A75A-F94B-B57A-46F276C03311}"/>
+              </a:ext>
+            </a:extLst>
+          </p:cNvPr>
+          <p:cNvSpPr>
+            <a:spLocks noGrp="1"/>
+          </p:cNvSpPr>
+          <p:nvPr>
+            <p:ph sz="half" idx="2"/>
+          </p:nvPr>
+        </p:nvSpPr>
+        <p:spPr>
+          <a:xfrm>
+            <a:off x="550864" y="1177871"/>
+            <a:ext cx="11125198" cy="4901339"/>
+          </a:xfrm>
+        </p:spPr>
+        <p:txBody>
+          <a:bodyPr>
+            <a:normAutofit/>
+          </a:bodyPr>
+          <a:lstStyle/>
+          <a:p>
+            <a:r>
+              <a:rPr lang="en-US" dirty="0"/>
+              <a:t>Based on experiences from tens (or hundreds if counting thesis projects) of student projects</a:t>
+            </a:r>
+          </a:p>
+          <a:p>
+            <a:r>
+              <a:rPr lang="en-US" dirty="0"/>
+              <a:t>Basically nothing earth shaking, but these things require thinking so that we can avoid these pitfalls from the start.</a:t>
+            </a:r>
+          </a:p>
+          <a:p>
+            <a:r>
+              <a:rPr lang="en-US" dirty="0">
+                <a:hlinkClick r:id="rId2"/>
+              </a:rPr>
+              <a:t>http://myy.haaga-helia.fi/~valju/perma/sw_project_courses/Software%20Development%20projects.pdf</a:t>
+            </a:r>
+            <a:endParaRPr lang="en-US" dirty="0"/>
+          </a:p>
+          <a:p>
+            <a:pPr lvl="1"/>
+            <a:endParaRPr lang="en-US" dirty="0"/>
+          </a:p>
+        </p:txBody>
+      </p:sp>
+      <p:sp>
+        <p:nvSpPr>
+          <p:cNvPr id="5" name="Date Placeholder 4">
+            <a:extLst>
+              <a:ext uri="{FF2B5EF4-FFF2-40B4-BE49-F238E27FC236}">
+                <a16:creationId xmlns:a16="http://schemas.microsoft.com/office/drawing/2014/main" id="{976244E2-AA76-2742-B2EC-FEC79276155C}"/>
+              </a:ext>
+            </a:extLst>
+          </p:cNvPr>
+          <p:cNvSpPr>
+            <a:spLocks noGrp="1"/>
+          </p:cNvSpPr>
+          <p:nvPr>
+            <p:ph type="dt" sz="half" idx="10"/>
+          </p:nvPr>
+        </p:nvSpPr>
+        <p:spPr/>
+        <p:txBody>
+          <a:bodyPr/>
+          <a:lstStyle/>
+          <a:p>
+            <a:fld id="{202E1EC2-47B8-044B-A09E-6A63B4D80C87}" type="datetime1">
+              <a:rPr lang="fi-FI" smtClean="0"/>
+              <a:t>13.12.2022</a:t>
+            </a:fld>
+            <a:endParaRPr lang="en-GB"/>
+          </a:p>
+        </p:txBody>
+      </p:sp>
+      <p:sp>
+        <p:nvSpPr>
+          <p:cNvPr id="6" name="Footer Placeholder 5">
+            <a:extLst>
+              <a:ext uri="{FF2B5EF4-FFF2-40B4-BE49-F238E27FC236}">
+                <a16:creationId xmlns:a16="http://schemas.microsoft.com/office/drawing/2014/main" id="{588CE607-4137-8840-8FEA-42EAC857E3A3}"/>
+              </a:ext>
+            </a:extLst>
+          </p:cNvPr>
+          <p:cNvSpPr>
+            <a:spLocks noGrp="1"/>
+          </p:cNvSpPr>
+          <p:nvPr>
+            <p:ph type="ftr" sz="quarter" idx="11"/>
+          </p:nvPr>
+        </p:nvSpPr>
+        <p:spPr/>
+        <p:txBody>
+          <a:bodyPr/>
+          <a:lstStyle/>
+          <a:p>
+            <a:endParaRPr lang="en-GB"/>
+          </a:p>
+        </p:txBody>
+      </p:sp>
+      <p:sp>
+        <p:nvSpPr>
+          <p:cNvPr id="7" name="Slide Number Placeholder 6">
+            <a:extLst>
+              <a:ext uri="{FF2B5EF4-FFF2-40B4-BE49-F238E27FC236}">
+                <a16:creationId xmlns:a16="http://schemas.microsoft.com/office/drawing/2014/main" id="{2E133A96-6C73-0844-B8CB-27C2B5F4CFB1}"/>
+              </a:ext>
+            </a:extLst>
+          </p:cNvPr>
+          <p:cNvSpPr>
+            <a:spLocks noGrp="1"/>
+          </p:cNvSpPr>
+          <p:nvPr>
+            <p:ph type="sldNum" sz="quarter" idx="12"/>
+          </p:nvPr>
+        </p:nvSpPr>
+        <p:spPr/>
+        <p:txBody>
+          <a:bodyPr/>
+          <a:lstStyle/>
+          <a:p>
+            <a:fld id="{76BAB7ED-EDE9-4D4B-9A2D-30E18C47C16E}" type="slidenum">
+              <a:rPr lang="en-GB" smtClean="0"/>
+              <a:t>9</a:t>
             </a:fld>
             <a:endParaRPr lang="en-GB"/>
           </a:p>
@@ -10210,21 +10439,6 @@
 </file>
 
 <file path=customXml/item1.xml><?xml version="1.0" encoding="utf-8"?>
-<p:properties xmlns:p="http://schemas.microsoft.com/office/2006/metadata/properties" xmlns:xsi="http://www.w3.org/2001/XMLSchema-instance" xmlns:pc="http://schemas.microsoft.com/office/infopath/2007/PartnerControls">
-  <documentManagement/>
-</p:properties>
-</file>
-
-<file path=customXml/item2.xml><?xml version="1.0" encoding="utf-8"?>
-<?mso-contentType ?>
-<FormTemplates xmlns="http://schemas.microsoft.com/sharepoint/v3/contenttype/forms">
-  <Display>DocumentLibraryForm</Display>
-  <Edit>DocumentLibraryForm</Edit>
-  <New>DocumentLibraryForm</New>
-</FormTemplates>
-</file>
-
-<file path=customXml/item3.xml><?xml version="1.0" encoding="utf-8"?>
 <ct:contentTypeSchema xmlns:ct="http://schemas.microsoft.com/office/2006/metadata/contentType" xmlns:ma="http://schemas.microsoft.com/office/2006/metadata/properties/metaAttributes" ct:_="" ma:_="" ma:contentTypeName="Document" ma:contentTypeID="0x0101008A03D813BDC1354CB9CC31017C1D507E" ma:contentTypeVersion="14" ma:contentTypeDescription="Create a new document." ma:contentTypeScope="" ma:versionID="8d610081a03aab79f4f6816a8abae875">
   <xsd:schema xmlns:xsd="http://www.w3.org/2001/XMLSchema" xmlns:xs="http://www.w3.org/2001/XMLSchema" xmlns:p="http://schemas.microsoft.com/office/2006/metadata/properties" xmlns:ns3="23ce7308-0f1e-43e9-aba3-b9c7d7318f5c" xmlns:ns4="a915d5db-83f9-4a1c-939a-8e707aa4dcbb" targetNamespace="http://schemas.microsoft.com/office/2006/metadata/properties" ma:root="true" ma:fieldsID="66de0da61abf087c2e24f3b57cbf177f" ns3:_="" ns4:_="">
     <xsd:import namespace="23ce7308-0f1e-43e9-aba3-b9c7d7318f5c"/>
@@ -10453,32 +10667,22 @@
 </ct:contentTypeSchema>
 </file>
 
-<file path=customXml/itemProps1.xml><?xml version="1.0" encoding="utf-8"?>
-<ds:datastoreItem xmlns:ds="http://schemas.openxmlformats.org/officeDocument/2006/customXml" ds:itemID="{DED4E12E-7268-4B03-A47B-0755D62B5E31}">
-  <ds:schemaRefs>
-    <ds:schemaRef ds:uri="http://schemas.microsoft.com/office/2006/documentManagement/types"/>
-    <ds:schemaRef ds:uri="http://purl.org/dc/elements/1.1/"/>
-    <ds:schemaRef ds:uri="http://purl.org/dc/dcmitype/"/>
-    <ds:schemaRef ds:uri="http://schemas.microsoft.com/office/infopath/2007/PartnerControls"/>
-    <ds:schemaRef ds:uri="http://schemas.microsoft.com/office/2006/metadata/properties"/>
-    <ds:schemaRef ds:uri="http://purl.org/dc/terms/"/>
-    <ds:schemaRef ds:uri="http://www.w3.org/XML/1998/namespace"/>
-    <ds:schemaRef ds:uri="http://schemas.openxmlformats.org/package/2006/metadata/core-properties"/>
-    <ds:schemaRef ds:uri="a915d5db-83f9-4a1c-939a-8e707aa4dcbb"/>
-    <ds:schemaRef ds:uri="23ce7308-0f1e-43e9-aba3-b9c7d7318f5c"/>
-  </ds:schemaRefs>
-</ds:datastoreItem>
+<file path=customXml/item2.xml><?xml version="1.0" encoding="utf-8"?>
+<?mso-contentType ?>
+<FormTemplates xmlns="http://schemas.microsoft.com/sharepoint/v3/contenttype/forms">
+  <Display>DocumentLibraryForm</Display>
+  <Edit>DocumentLibraryForm</Edit>
+  <New>DocumentLibraryForm</New>
+</FormTemplates>
 </file>
 
-<file path=customXml/itemProps2.xml><?xml version="1.0" encoding="utf-8"?>
-<ds:datastoreItem xmlns:ds="http://schemas.openxmlformats.org/officeDocument/2006/customXml" ds:itemID="{D546C03B-CD3A-4EA0-AAA4-0E00E896454E}">
-  <ds:schemaRefs>
-    <ds:schemaRef ds:uri="http://schemas.microsoft.com/sharepoint/v3/contenttype/forms"/>
-  </ds:schemaRefs>
-</ds:datastoreItem>
+<file path=customXml/item3.xml><?xml version="1.0" encoding="utf-8"?>
+<p:properties xmlns:p="http://schemas.microsoft.com/office/2006/metadata/properties" xmlns:xsi="http://www.w3.org/2001/XMLSchema-instance" xmlns:pc="http://schemas.microsoft.com/office/infopath/2007/PartnerControls">
+  <documentManagement/>
+</p:properties>
 </file>
 
-<file path=customXml/itemProps3.xml><?xml version="1.0" encoding="utf-8"?>
+<file path=customXml/itemProps1.xml><?xml version="1.0" encoding="utf-8"?>
 <ds:datastoreItem xmlns:ds="http://schemas.openxmlformats.org/officeDocument/2006/customXml" ds:itemID="{66BA7D05-A425-4449-B909-FD98A040947D}">
   <ds:schemaRefs>
     <ds:schemaRef ds:uri="http://schemas.microsoft.com/office/2006/metadata/contentType"/>
@@ -10495,4 +10699,29 @@
     <ds:schemaRef ds:uri="http://schemas.microsoft.com/internal/obd"/>
   </ds:schemaRefs>
 </ds:datastoreItem>
+</file>
+
+<file path=customXml/itemProps2.xml><?xml version="1.0" encoding="utf-8"?>
+<ds:datastoreItem xmlns:ds="http://schemas.openxmlformats.org/officeDocument/2006/customXml" ds:itemID="{D546C03B-CD3A-4EA0-AAA4-0E00E896454E}">
+  <ds:schemaRefs>
+    <ds:schemaRef ds:uri="http://schemas.microsoft.com/sharepoint/v3/contenttype/forms"/>
+  </ds:schemaRefs>
+</ds:datastoreItem>
+</file>
+
+<file path=customXml/itemProps3.xml><?xml version="1.0" encoding="utf-8"?>
+<ds:datastoreItem xmlns:ds="http://schemas.openxmlformats.org/officeDocument/2006/customXml" ds:itemID="{DED4E12E-7268-4B03-A47B-0755D62B5E31}">
+  <ds:schemaRefs>
+    <ds:schemaRef ds:uri="http://schemas.microsoft.com/office/2006/documentManagement/types"/>
+    <ds:schemaRef ds:uri="http://purl.org/dc/elements/1.1/"/>
+    <ds:schemaRef ds:uri="http://purl.org/dc/dcmitype/"/>
+    <ds:schemaRef ds:uri="http://schemas.microsoft.com/office/infopath/2007/PartnerControls"/>
+    <ds:schemaRef ds:uri="http://schemas.microsoft.com/office/2006/metadata/properties"/>
+    <ds:schemaRef ds:uri="http://purl.org/dc/terms/"/>
+    <ds:schemaRef ds:uri="http://www.w3.org/XML/1998/namespace"/>
+    <ds:schemaRef ds:uri="http://schemas.openxmlformats.org/package/2006/metadata/core-properties"/>
+    <ds:schemaRef ds:uri="a915d5db-83f9-4a1c-939a-8e707aa4dcbb"/>
+    <ds:schemaRef ds:uri="23ce7308-0f1e-43e9-aba3-b9c7d7318f5c"/>
+  </ds:schemaRefs>
+</ds:datastoreItem>
 </file>
</xml_diff>

<commit_message>
Projektikurssiin orientoiva powerpoint muokattu taas
</commit_message>
<xml_diff>
--- a/06_ohjelmistoarkkitehtuurit_ja_patternit/SoftwareProjects_LessonsLearned.pptx
+++ b/06_ohjelmistoarkkitehtuurit_ja_patternit/SoftwareProjects_LessonsLearned.pptx
@@ -7571,8 +7571,13 @@
             </a:r>
             <a:r>
               <a:rPr lang="fi-FI" sz="2800" dirty="0"/>
-              <a:t> life</a:t>
-            </a:r>
+              <a:t> SW </a:t>
+            </a:r>
+            <a:r>
+              <a:rPr lang="fi-FI" sz="2800" dirty="0" err="1"/>
+              <a:t>firms</a:t>
+            </a:r>
+            <a:endParaRPr lang="fi-FI" sz="2800" dirty="0"/>
           </a:p>
           <a:p>
             <a:pPr>
@@ -7924,7 +7929,7 @@
             </a:r>
             <a:r>
               <a:rPr lang="fi-FI" sz="2800" dirty="0" err="1"/>
-              <a:t>this</a:t>
+              <a:t>that</a:t>
             </a:r>
             <a:r>
               <a:rPr lang="fi-FI" sz="2800" dirty="0"/>
@@ -7948,7 +7953,7 @@
             </a:r>
             <a:r>
               <a:rPr lang="fi-FI" sz="2800" dirty="0" err="1"/>
-              <a:t>this</a:t>
+              <a:t>that</a:t>
             </a:r>
             <a:r>
               <a:rPr lang="fi-FI" sz="2800" dirty="0"/>
@@ -8028,7 +8033,15 @@
             </a:r>
             <a:r>
               <a:rPr lang="fi-FI" sz="2800" dirty="0"/>
-              <a:t> (</a:t>
+              <a:t> </a:t>
+            </a:r>
+            <a:r>
+              <a:rPr lang="fi-FI" sz="2800" dirty="0" err="1"/>
+              <a:t>do</a:t>
+            </a:r>
+            <a:r>
+              <a:rPr lang="fi-FI" sz="2800" dirty="0"/>
+              <a:t>. (</a:t>
             </a:r>
             <a:r>
               <a:rPr lang="fi-FI" sz="2800" dirty="0" err="1"/>
@@ -8050,7 +8063,18 @@
               <a:rPr lang="fi-FI" sz="2800" dirty="0" err="1"/>
               <a:t>customer</a:t>
             </a:r>
-            <a:endParaRPr lang="fi-FI" sz="2800" dirty="0"/>
+            <a:r>
+              <a:rPr lang="fi-FI" sz="2800" dirty="0"/>
+              <a:t> </a:t>
+            </a:r>
+            <a:r>
+              <a:rPr lang="fi-FI" sz="2800" dirty="0" err="1"/>
+              <a:t>contacts</a:t>
+            </a:r>
+            <a:r>
+              <a:rPr lang="fi-FI" sz="2800" dirty="0"/>
+              <a:t>)</a:t>
+            </a:r>
           </a:p>
         </p:txBody>
       </p:sp>
@@ -8534,76 +8558,124 @@
           <a:lstStyle/>
           <a:p>
             <a:r>
-              <a:rPr lang="en-US" dirty="0"/>
+              <a:rPr lang="en-US" b="1" dirty="0">
+                <a:solidFill>
+                  <a:srgbClr val="00B050"/>
+                </a:solidFill>
+              </a:rPr>
               <a:t>Scrum understood, philosophy digested and followed. Teams can get fully Scrum-autonomous</a:t>
             </a:r>
           </a:p>
           <a:p>
             <a:pPr lvl="1"/>
             <a:r>
-              <a:rPr lang="en-US" dirty="0"/>
+              <a:rPr lang="en-US" b="1" dirty="0">
+                <a:solidFill>
+                  <a:srgbClr val="00B050"/>
+                </a:solidFill>
+              </a:rPr>
               <a:t>Also some visually pleasant and intuitive Scrum tool used properly	 </a:t>
             </a:r>
           </a:p>
           <a:p>
             <a:r>
-              <a:rPr lang="en-US" dirty="0"/>
+              <a:rPr lang="en-US" b="1" dirty="0">
+                <a:solidFill>
+                  <a:srgbClr val="00B050"/>
+                </a:solidFill>
+              </a:rPr>
               <a:t>Communication and reactions</a:t>
             </a:r>
           </a:p>
           <a:p>
             <a:pPr lvl="1"/>
             <a:r>
-              <a:rPr lang="en-US" dirty="0"/>
+              <a:rPr lang="en-US" b="1" dirty="0">
+                <a:solidFill>
+                  <a:srgbClr val="00B050"/>
+                </a:solidFill>
+              </a:rPr>
               <a:t>Communication tool and channels, e.g. 10 well-thought channels in Teams/Slack. </a:t>
             </a:r>
           </a:p>
           <a:p>
             <a:pPr lvl="1"/>
             <a:r>
-              <a:rPr lang="en-US" dirty="0"/>
+              <a:rPr lang="en-US" b="1" dirty="0">
+                <a:solidFill>
+                  <a:srgbClr val="00B050"/>
+                </a:solidFill>
+              </a:rPr>
               <a:t>Meeting and file naming. Reactions to someone working at Saturday night.</a:t>
             </a:r>
           </a:p>
           <a:p>
             <a:r>
-              <a:rPr lang="en-US" dirty="0"/>
+              <a:rPr lang="en-US" b="1" dirty="0">
+                <a:solidFill>
+                  <a:srgbClr val="00B050"/>
+                </a:solidFill>
+              </a:rPr>
               <a:t>Agile documentation</a:t>
             </a:r>
           </a:p>
           <a:p>
             <a:r>
-              <a:rPr lang="en-US" dirty="0"/>
+              <a:rPr lang="en-US" b="1" dirty="0">
+                <a:solidFill>
+                  <a:srgbClr val="00B050"/>
+                </a:solidFill>
+              </a:rPr>
               <a:t>Architecture and sound SW philosophy</a:t>
             </a:r>
           </a:p>
           <a:p>
             <a:r>
-              <a:rPr lang="en-US" dirty="0"/>
+              <a:rPr lang="en-US" b="1" dirty="0">
+                <a:solidFill>
+                  <a:srgbClr val="00B050"/>
+                </a:solidFill>
+              </a:rPr>
+              <a:t>Git process and review skills</a:t>
+            </a:r>
+          </a:p>
+          <a:p>
+            <a:r>
+              <a:rPr lang="en-US" b="1" dirty="0">
+                <a:solidFill>
+                  <a:srgbClr val="00B050"/>
+                </a:solidFill>
+              </a:rPr>
               <a:t>Technical skills</a:t>
             </a:r>
           </a:p>
           <a:p>
             <a:r>
-              <a:rPr lang="en-US" dirty="0"/>
-              <a:t>Git process and review skills</a:t>
-            </a:r>
-          </a:p>
-          <a:p>
-            <a:r>
-              <a:rPr lang="en-US" dirty="0"/>
+              <a:rPr lang="en-US" b="1" dirty="0">
+                <a:solidFill>
+                  <a:srgbClr val="00B050"/>
+                </a:solidFill>
+              </a:rPr>
               <a:t>Spreading the skills and knowledge across the team(s)</a:t>
             </a:r>
           </a:p>
           <a:p>
             <a:r>
-              <a:rPr lang="en-US" dirty="0"/>
+              <a:rPr lang="en-US" b="1" dirty="0">
+                <a:solidFill>
+                  <a:srgbClr val="00B050"/>
+                </a:solidFill>
+              </a:rPr>
               <a:t>Courage</a:t>
             </a:r>
           </a:p>
           <a:p>
             <a:r>
-              <a:rPr lang="en-US" dirty="0"/>
+              <a:rPr lang="en-US" b="1" dirty="0">
+                <a:solidFill>
+                  <a:srgbClr val="00B050"/>
+                </a:solidFill>
+              </a:rPr>
               <a:t>Lean prototyping approach to product development (avoid the “analysis paralysis”)</a:t>
             </a:r>
           </a:p>
@@ -9770,6 +9842,25 @@
               <a:rPr lang="en-US" dirty="0"/>
               <a:t>Basically nothing earth shaking, but these things require thinking so that we can avoid these pitfalls from the start.</a:t>
             </a:r>
+          </a:p>
+          <a:p>
+            <a:r>
+              <a:rPr lang="en-US" dirty="0"/>
+              <a:t>Not a </a:t>
+            </a:r>
+            <a:r>
+              <a:rPr lang="en-US" dirty="0" err="1"/>
+              <a:t>Pulizer</a:t>
+            </a:r>
+            <a:r>
+              <a:rPr lang="en-US" dirty="0"/>
+              <a:t> price winner, but certainly lists points that some projects </a:t>
+            </a:r>
+            <a:r>
+              <a:rPr lang="en-US"/>
+              <a:t>could have used in past.</a:t>
+            </a:r>
+            <a:endParaRPr lang="en-US" dirty="0"/>
           </a:p>
           <a:p>
             <a:r>
@@ -10439,6 +10530,21 @@
 </file>
 
 <file path=customXml/item1.xml><?xml version="1.0" encoding="utf-8"?>
+<p:properties xmlns:p="http://schemas.microsoft.com/office/2006/metadata/properties" xmlns:xsi="http://www.w3.org/2001/XMLSchema-instance" xmlns:pc="http://schemas.microsoft.com/office/infopath/2007/PartnerControls">
+  <documentManagement/>
+</p:properties>
+</file>
+
+<file path=customXml/item2.xml><?xml version="1.0" encoding="utf-8"?>
+<?mso-contentType ?>
+<FormTemplates xmlns="http://schemas.microsoft.com/sharepoint/v3/contenttype/forms">
+  <Display>DocumentLibraryForm</Display>
+  <Edit>DocumentLibraryForm</Edit>
+  <New>DocumentLibraryForm</New>
+</FormTemplates>
+</file>
+
+<file path=customXml/item3.xml><?xml version="1.0" encoding="utf-8"?>
 <ct:contentTypeSchema xmlns:ct="http://schemas.microsoft.com/office/2006/metadata/contentType" xmlns:ma="http://schemas.microsoft.com/office/2006/metadata/properties/metaAttributes" ct:_="" ma:_="" ma:contentTypeName="Document" ma:contentTypeID="0x0101008A03D813BDC1354CB9CC31017C1D507E" ma:contentTypeVersion="14" ma:contentTypeDescription="Create a new document." ma:contentTypeScope="" ma:versionID="8d610081a03aab79f4f6816a8abae875">
   <xsd:schema xmlns:xsd="http://www.w3.org/2001/XMLSchema" xmlns:xs="http://www.w3.org/2001/XMLSchema" xmlns:p="http://schemas.microsoft.com/office/2006/metadata/properties" xmlns:ns3="23ce7308-0f1e-43e9-aba3-b9c7d7318f5c" xmlns:ns4="a915d5db-83f9-4a1c-939a-8e707aa4dcbb" targetNamespace="http://schemas.microsoft.com/office/2006/metadata/properties" ma:root="true" ma:fieldsID="66de0da61abf087c2e24f3b57cbf177f" ns3:_="" ns4:_="">
     <xsd:import namespace="23ce7308-0f1e-43e9-aba3-b9c7d7318f5c"/>
@@ -10667,22 +10773,32 @@
 </ct:contentTypeSchema>
 </file>
 
-<file path=customXml/item2.xml><?xml version="1.0" encoding="utf-8"?>
-<?mso-contentType ?>
-<FormTemplates xmlns="http://schemas.microsoft.com/sharepoint/v3/contenttype/forms">
-  <Display>DocumentLibraryForm</Display>
-  <Edit>DocumentLibraryForm</Edit>
-  <New>DocumentLibraryForm</New>
-</FormTemplates>
+<file path=customXml/itemProps1.xml><?xml version="1.0" encoding="utf-8"?>
+<ds:datastoreItem xmlns:ds="http://schemas.openxmlformats.org/officeDocument/2006/customXml" ds:itemID="{DED4E12E-7268-4B03-A47B-0755D62B5E31}">
+  <ds:schemaRefs>
+    <ds:schemaRef ds:uri="http://schemas.microsoft.com/office/2006/documentManagement/types"/>
+    <ds:schemaRef ds:uri="http://purl.org/dc/elements/1.1/"/>
+    <ds:schemaRef ds:uri="http://purl.org/dc/dcmitype/"/>
+    <ds:schemaRef ds:uri="http://schemas.microsoft.com/office/infopath/2007/PartnerControls"/>
+    <ds:schemaRef ds:uri="http://schemas.microsoft.com/office/2006/metadata/properties"/>
+    <ds:schemaRef ds:uri="http://purl.org/dc/terms/"/>
+    <ds:schemaRef ds:uri="http://www.w3.org/XML/1998/namespace"/>
+    <ds:schemaRef ds:uri="http://schemas.openxmlformats.org/package/2006/metadata/core-properties"/>
+    <ds:schemaRef ds:uri="a915d5db-83f9-4a1c-939a-8e707aa4dcbb"/>
+    <ds:schemaRef ds:uri="23ce7308-0f1e-43e9-aba3-b9c7d7318f5c"/>
+  </ds:schemaRefs>
+</ds:datastoreItem>
 </file>
 
-<file path=customXml/item3.xml><?xml version="1.0" encoding="utf-8"?>
-<p:properties xmlns:p="http://schemas.microsoft.com/office/2006/metadata/properties" xmlns:xsi="http://www.w3.org/2001/XMLSchema-instance" xmlns:pc="http://schemas.microsoft.com/office/infopath/2007/PartnerControls">
-  <documentManagement/>
-</p:properties>
+<file path=customXml/itemProps2.xml><?xml version="1.0" encoding="utf-8"?>
+<ds:datastoreItem xmlns:ds="http://schemas.openxmlformats.org/officeDocument/2006/customXml" ds:itemID="{D546C03B-CD3A-4EA0-AAA4-0E00E896454E}">
+  <ds:schemaRefs>
+    <ds:schemaRef ds:uri="http://schemas.microsoft.com/sharepoint/v3/contenttype/forms"/>
+  </ds:schemaRefs>
+</ds:datastoreItem>
 </file>
 
-<file path=customXml/itemProps1.xml><?xml version="1.0" encoding="utf-8"?>
+<file path=customXml/itemProps3.xml><?xml version="1.0" encoding="utf-8"?>
 <ds:datastoreItem xmlns:ds="http://schemas.openxmlformats.org/officeDocument/2006/customXml" ds:itemID="{66BA7D05-A425-4449-B909-FD98A040947D}">
   <ds:schemaRefs>
     <ds:schemaRef ds:uri="http://schemas.microsoft.com/office/2006/metadata/contentType"/>
@@ -10699,29 +10815,4 @@
     <ds:schemaRef ds:uri="http://schemas.microsoft.com/internal/obd"/>
   </ds:schemaRefs>
 </ds:datastoreItem>
-</file>
-
-<file path=customXml/itemProps2.xml><?xml version="1.0" encoding="utf-8"?>
-<ds:datastoreItem xmlns:ds="http://schemas.openxmlformats.org/officeDocument/2006/customXml" ds:itemID="{D546C03B-CD3A-4EA0-AAA4-0E00E896454E}">
-  <ds:schemaRefs>
-    <ds:schemaRef ds:uri="http://schemas.microsoft.com/sharepoint/v3/contenttype/forms"/>
-  </ds:schemaRefs>
-</ds:datastoreItem>
-</file>
-
-<file path=customXml/itemProps3.xml><?xml version="1.0" encoding="utf-8"?>
-<ds:datastoreItem xmlns:ds="http://schemas.openxmlformats.org/officeDocument/2006/customXml" ds:itemID="{DED4E12E-7268-4B03-A47B-0755D62B5E31}">
-  <ds:schemaRefs>
-    <ds:schemaRef ds:uri="http://schemas.microsoft.com/office/2006/documentManagement/types"/>
-    <ds:schemaRef ds:uri="http://purl.org/dc/elements/1.1/"/>
-    <ds:schemaRef ds:uri="http://purl.org/dc/dcmitype/"/>
-    <ds:schemaRef ds:uri="http://schemas.microsoft.com/office/infopath/2007/PartnerControls"/>
-    <ds:schemaRef ds:uri="http://schemas.microsoft.com/office/2006/metadata/properties"/>
-    <ds:schemaRef ds:uri="http://purl.org/dc/terms/"/>
-    <ds:schemaRef ds:uri="http://www.w3.org/XML/1998/namespace"/>
-    <ds:schemaRef ds:uri="http://schemas.openxmlformats.org/package/2006/metadata/core-properties"/>
-    <ds:schemaRef ds:uri="a915d5db-83f9-4a1c-939a-8e707aa4dcbb"/>
-    <ds:schemaRef ds:uri="23ce7308-0f1e-43e9-aba3-b9c7d7318f5c"/>
-  </ds:schemaRefs>
-</ds:datastoreItem>
 </file>
</xml_diff>

<commit_message>
Projektikurssiin orientoiva powerpoint muokattu taas 2
</commit_message>
<xml_diff>
--- a/06_ohjelmistoarkkitehtuurit_ja_patternit/SoftwareProjects_LessonsLearned.pptx
+++ b/06_ohjelmistoarkkitehtuurit_ja_patternit/SoftwareProjects_LessonsLearned.pptx
@@ -9600,14 +9600,14 @@
           <a:p>
             <a:r>
               <a:rPr lang="en-US" dirty="0"/>
-              <a:t>Also in this important topic we have the non-simple thinking:</a:t>
+              <a:t>Also in this important topic we have the non-simple thinking. This is an example of 2 ‘conflicting’ approaches</a:t>
             </a:r>
           </a:p>
           <a:p>
             <a:pPr lvl="1"/>
             <a:r>
               <a:rPr lang="en-US" dirty="0"/>
-              <a:t>While learning in school we might do heavy documentation, where the process of creating is important</a:t>
+              <a:t>While learning in school we might do heavy documentation, where the learning process steps are important</a:t>
             </a:r>
           </a:p>
           <a:p>
@@ -9615,6 +9615,35 @@
             <a:r>
               <a:rPr lang="en-US" dirty="0"/>
               <a:t>While doing real project we emphasize maintainability and agility also for documentation    </a:t>
+            </a:r>
+          </a:p>
+          <a:p>
+            <a:pPr lvl="1"/>
+            <a:endParaRPr lang="en-US"/>
+          </a:p>
+          <a:p>
+            <a:pPr lvl="1"/>
+            <a:endParaRPr lang="en-US" dirty="0"/>
+          </a:p>
+          <a:p>
+            <a:r>
+              <a:rPr lang="en-US" dirty="0"/>
+              <a:t>A bit different but related important hint:</a:t>
+            </a:r>
+          </a:p>
+          <a:p>
+            <a:pPr lvl="1"/>
+            <a:r>
+              <a:rPr lang="en-US" b="1" dirty="0">
+                <a:solidFill>
+                  <a:srgbClr val="00B050"/>
+                </a:solidFill>
+              </a:rPr>
+              <a:t>Make your own notes! </a:t>
+            </a:r>
+            <a:r>
+              <a:rPr lang="en-US" dirty="0"/>
+              <a:t>While e.g. meeting customer, make a text file for yourself, name it well and save to good folder before the meeting. Put there date, which customer was present and then all of your notes. Fast written, format not important, 100% correctness is not important. In every project we happen wonder what was said in the meetings. Plus we get all the future development ideas written down when they occur. Shows respect for the customer too.</a:t>
             </a:r>
           </a:p>
           <a:p>
@@ -10530,21 +10559,6 @@
 </file>
 
 <file path=customXml/item1.xml><?xml version="1.0" encoding="utf-8"?>
-<p:properties xmlns:p="http://schemas.microsoft.com/office/2006/metadata/properties" xmlns:xsi="http://www.w3.org/2001/XMLSchema-instance" xmlns:pc="http://schemas.microsoft.com/office/infopath/2007/PartnerControls">
-  <documentManagement/>
-</p:properties>
-</file>
-
-<file path=customXml/item2.xml><?xml version="1.0" encoding="utf-8"?>
-<?mso-contentType ?>
-<FormTemplates xmlns="http://schemas.microsoft.com/sharepoint/v3/contenttype/forms">
-  <Display>DocumentLibraryForm</Display>
-  <Edit>DocumentLibraryForm</Edit>
-  <New>DocumentLibraryForm</New>
-</FormTemplates>
-</file>
-
-<file path=customXml/item3.xml><?xml version="1.0" encoding="utf-8"?>
 <ct:contentTypeSchema xmlns:ct="http://schemas.microsoft.com/office/2006/metadata/contentType" xmlns:ma="http://schemas.microsoft.com/office/2006/metadata/properties/metaAttributes" ct:_="" ma:_="" ma:contentTypeName="Document" ma:contentTypeID="0x0101008A03D813BDC1354CB9CC31017C1D507E" ma:contentTypeVersion="14" ma:contentTypeDescription="Create a new document." ma:contentTypeScope="" ma:versionID="8d610081a03aab79f4f6816a8abae875">
   <xsd:schema xmlns:xsd="http://www.w3.org/2001/XMLSchema" xmlns:xs="http://www.w3.org/2001/XMLSchema" xmlns:p="http://schemas.microsoft.com/office/2006/metadata/properties" xmlns:ns3="23ce7308-0f1e-43e9-aba3-b9c7d7318f5c" xmlns:ns4="a915d5db-83f9-4a1c-939a-8e707aa4dcbb" targetNamespace="http://schemas.microsoft.com/office/2006/metadata/properties" ma:root="true" ma:fieldsID="66de0da61abf087c2e24f3b57cbf177f" ns3:_="" ns4:_="">
     <xsd:import namespace="23ce7308-0f1e-43e9-aba3-b9c7d7318f5c"/>
@@ -10773,32 +10787,22 @@
 </ct:contentTypeSchema>
 </file>
 
-<file path=customXml/itemProps1.xml><?xml version="1.0" encoding="utf-8"?>
-<ds:datastoreItem xmlns:ds="http://schemas.openxmlformats.org/officeDocument/2006/customXml" ds:itemID="{DED4E12E-7268-4B03-A47B-0755D62B5E31}">
-  <ds:schemaRefs>
-    <ds:schemaRef ds:uri="http://schemas.microsoft.com/office/2006/documentManagement/types"/>
-    <ds:schemaRef ds:uri="http://purl.org/dc/elements/1.1/"/>
-    <ds:schemaRef ds:uri="http://purl.org/dc/dcmitype/"/>
-    <ds:schemaRef ds:uri="http://schemas.microsoft.com/office/infopath/2007/PartnerControls"/>
-    <ds:schemaRef ds:uri="http://schemas.microsoft.com/office/2006/metadata/properties"/>
-    <ds:schemaRef ds:uri="http://purl.org/dc/terms/"/>
-    <ds:schemaRef ds:uri="http://www.w3.org/XML/1998/namespace"/>
-    <ds:schemaRef ds:uri="http://schemas.openxmlformats.org/package/2006/metadata/core-properties"/>
-    <ds:schemaRef ds:uri="a915d5db-83f9-4a1c-939a-8e707aa4dcbb"/>
-    <ds:schemaRef ds:uri="23ce7308-0f1e-43e9-aba3-b9c7d7318f5c"/>
-  </ds:schemaRefs>
-</ds:datastoreItem>
+<file path=customXml/item2.xml><?xml version="1.0" encoding="utf-8"?>
+<?mso-contentType ?>
+<FormTemplates xmlns="http://schemas.microsoft.com/sharepoint/v3/contenttype/forms">
+  <Display>DocumentLibraryForm</Display>
+  <Edit>DocumentLibraryForm</Edit>
+  <New>DocumentLibraryForm</New>
+</FormTemplates>
 </file>
 
-<file path=customXml/itemProps2.xml><?xml version="1.0" encoding="utf-8"?>
-<ds:datastoreItem xmlns:ds="http://schemas.openxmlformats.org/officeDocument/2006/customXml" ds:itemID="{D546C03B-CD3A-4EA0-AAA4-0E00E896454E}">
-  <ds:schemaRefs>
-    <ds:schemaRef ds:uri="http://schemas.microsoft.com/sharepoint/v3/contenttype/forms"/>
-  </ds:schemaRefs>
-</ds:datastoreItem>
+<file path=customXml/item3.xml><?xml version="1.0" encoding="utf-8"?>
+<p:properties xmlns:p="http://schemas.microsoft.com/office/2006/metadata/properties" xmlns:xsi="http://www.w3.org/2001/XMLSchema-instance" xmlns:pc="http://schemas.microsoft.com/office/infopath/2007/PartnerControls">
+  <documentManagement/>
+</p:properties>
 </file>
 
-<file path=customXml/itemProps3.xml><?xml version="1.0" encoding="utf-8"?>
+<file path=customXml/itemProps1.xml><?xml version="1.0" encoding="utf-8"?>
 <ds:datastoreItem xmlns:ds="http://schemas.openxmlformats.org/officeDocument/2006/customXml" ds:itemID="{66BA7D05-A425-4449-B909-FD98A040947D}">
   <ds:schemaRefs>
     <ds:schemaRef ds:uri="http://schemas.microsoft.com/office/2006/metadata/contentType"/>
@@ -10815,4 +10819,29 @@
     <ds:schemaRef ds:uri="http://schemas.microsoft.com/internal/obd"/>
   </ds:schemaRefs>
 </ds:datastoreItem>
+</file>
+
+<file path=customXml/itemProps2.xml><?xml version="1.0" encoding="utf-8"?>
+<ds:datastoreItem xmlns:ds="http://schemas.openxmlformats.org/officeDocument/2006/customXml" ds:itemID="{D546C03B-CD3A-4EA0-AAA4-0E00E896454E}">
+  <ds:schemaRefs>
+    <ds:schemaRef ds:uri="http://schemas.microsoft.com/sharepoint/v3/contenttype/forms"/>
+  </ds:schemaRefs>
+</ds:datastoreItem>
+</file>
+
+<file path=customXml/itemProps3.xml><?xml version="1.0" encoding="utf-8"?>
+<ds:datastoreItem xmlns:ds="http://schemas.openxmlformats.org/officeDocument/2006/customXml" ds:itemID="{DED4E12E-7268-4B03-A47B-0755D62B5E31}">
+  <ds:schemaRefs>
+    <ds:schemaRef ds:uri="http://schemas.microsoft.com/office/2006/documentManagement/types"/>
+    <ds:schemaRef ds:uri="http://purl.org/dc/elements/1.1/"/>
+    <ds:schemaRef ds:uri="http://purl.org/dc/dcmitype/"/>
+    <ds:schemaRef ds:uri="http://schemas.microsoft.com/office/infopath/2007/PartnerControls"/>
+    <ds:schemaRef ds:uri="http://schemas.microsoft.com/office/2006/metadata/properties"/>
+    <ds:schemaRef ds:uri="http://purl.org/dc/terms/"/>
+    <ds:schemaRef ds:uri="http://www.w3.org/XML/1998/namespace"/>
+    <ds:schemaRef ds:uri="http://schemas.openxmlformats.org/package/2006/metadata/core-properties"/>
+    <ds:schemaRef ds:uri="a915d5db-83f9-4a1c-939a-8e707aa4dcbb"/>
+    <ds:schemaRef ds:uri="23ce7308-0f1e-43e9-aba3-b9c7d7318f5c"/>
+  </ds:schemaRefs>
+</ds:datastoreItem>
 </file>
</xml_diff>

<commit_message>
Project lessons learned edited for explanations etc.
</commit_message>
<xml_diff>
--- a/06_ohjelmistoarkkitehtuurit_ja_patternit/SoftwareProjects_LessonsLearned.pptx
+++ b/06_ohjelmistoarkkitehtuurit_ja_patternit/SoftwareProjects_LessonsLearned.pptx
@@ -1721,7 +1721,7 @@
           <a:p>
             <a:fld id="{5645C365-1C26-6946-87AF-75D6A7DF4277}" type="datetimeFigureOut">
               <a:rPr lang="en-GB" smtClean="0"/>
-              <a:t>13/12/2022</a:t>
+              <a:t>14/01/2023</a:t>
             </a:fld>
             <a:endParaRPr lang="en-GB"/>
           </a:p>
@@ -2220,7 +2220,7 @@
           <a:p>
             <a:fld id="{35B864B8-8D08-7B43-B4FB-B2FB41A5D9E3}" type="datetime1">
               <a:rPr lang="fi-FI" smtClean="0"/>
-              <a:t>13.12.2022</a:t>
+              <a:t>14.1.2023</a:t>
             </a:fld>
             <a:endParaRPr lang="en-GB" dirty="0"/>
           </a:p>
@@ -2547,7 +2547,7 @@
           <a:p>
             <a:fld id="{D5AEA85A-FC56-D34C-9AA6-ECC3D2586F37}" type="datetime1">
               <a:rPr lang="fi-FI" smtClean="0"/>
-              <a:t>13.12.2022</a:t>
+              <a:t>14.1.2023</a:t>
             </a:fld>
             <a:endParaRPr lang="en-GB" dirty="0"/>
           </a:p>
@@ -2757,7 +2757,7 @@
           <a:p>
             <a:fld id="{E6BC6EEF-E660-7844-8930-418AFF95EA40}" type="datetime1">
               <a:rPr lang="fi-FI" smtClean="0"/>
-              <a:t>13.12.2022</a:t>
+              <a:t>14.1.2023</a:t>
             </a:fld>
             <a:endParaRPr lang="en-GB" dirty="0"/>
           </a:p>
@@ -3066,7 +3066,7 @@
           <a:p>
             <a:fld id="{4E10C7EC-C1C1-9849-A573-7692478FCD52}" type="datetime1">
               <a:rPr lang="fi-FI" smtClean="0"/>
-              <a:t>13.12.2022</a:t>
+              <a:t>14.1.2023</a:t>
             </a:fld>
             <a:endParaRPr lang="en-GB" dirty="0"/>
           </a:p>
@@ -3339,7 +3339,7 @@
           <a:p>
             <a:fld id="{844FF3FE-30BE-2040-9151-6FBC4992BF4F}" type="datetime1">
               <a:rPr lang="fi-FI" smtClean="0"/>
-              <a:t>13.12.2022</a:t>
+              <a:t>14.1.2023</a:t>
             </a:fld>
             <a:endParaRPr lang="en-GB" dirty="0"/>
           </a:p>
@@ -3579,7 +3579,7 @@
           <a:p>
             <a:fld id="{11EDCD7B-6966-E249-89F2-D46BDFBF56BE}" type="datetime1">
               <a:rPr lang="fi-FI" smtClean="0"/>
-              <a:t>13.12.2022</a:t>
+              <a:t>14.1.2023</a:t>
             </a:fld>
             <a:endParaRPr lang="en-GB" dirty="0"/>
           </a:p>
@@ -3872,7 +3872,7 @@
           <a:p>
             <a:fld id="{11EDCD7B-6966-E249-89F2-D46BDFBF56BE}" type="datetime1">
               <a:rPr lang="fi-FI" smtClean="0"/>
-              <a:t>13.12.2022</a:t>
+              <a:t>14.1.2023</a:t>
             </a:fld>
             <a:endParaRPr lang="en-GB" dirty="0"/>
           </a:p>
@@ -4311,7 +4311,7 @@
           <a:p>
             <a:fld id="{844FF3FE-30BE-2040-9151-6FBC4992BF4F}" type="datetime1">
               <a:rPr lang="fi-FI" smtClean="0"/>
-              <a:t>13.12.2022</a:t>
+              <a:t>14.1.2023</a:t>
             </a:fld>
             <a:endParaRPr lang="en-GB" dirty="0"/>
           </a:p>
@@ -4539,7 +4539,7 @@
           <a:p>
             <a:fld id="{11EDCD7B-6966-E249-89F2-D46BDFBF56BE}" type="datetime1">
               <a:rPr lang="fi-FI" smtClean="0"/>
-              <a:t>13.12.2022</a:t>
+              <a:t>14.1.2023</a:t>
             </a:fld>
             <a:endParaRPr lang="en-GB" dirty="0"/>
           </a:p>
@@ -4954,7 +4954,7 @@
           <a:p>
             <a:fld id="{B62E192A-D52B-F541-B2AA-4AEB9388F1F7}" type="datetime1">
               <a:rPr lang="fi-FI" smtClean="0"/>
-              <a:t>13.12.2022</a:t>
+              <a:t>14.1.2023</a:t>
             </a:fld>
             <a:endParaRPr lang="en-GB" dirty="0"/>
           </a:p>
@@ -5254,7 +5254,7 @@
           <a:p>
             <a:fld id="{EEA4FAA2-2B3E-264C-A42F-2D6D3EF33A3C}" type="datetime1">
               <a:rPr lang="fi-FI" smtClean="0"/>
-              <a:t>13.12.2022</a:t>
+              <a:t>14.1.2023</a:t>
             </a:fld>
             <a:endParaRPr lang="en-GB" dirty="0"/>
           </a:p>
@@ -6157,7 +6157,7 @@
           <a:p>
             <a:fld id="{B3114A65-8017-1743-A85A-B2A4BB835AE9}" type="datetime1">
               <a:rPr lang="fi-FI" smtClean="0"/>
-              <a:t>13.12.2022</a:t>
+              <a:t>14.1.2023</a:t>
             </a:fld>
             <a:endParaRPr lang="en-GB" dirty="0"/>
           </a:p>
@@ -6385,7 +6385,7 @@
           <a:p>
             <a:fld id="{11EDCD7B-6966-E249-89F2-D46BDFBF56BE}" type="datetime1">
               <a:rPr lang="fi-FI" smtClean="0"/>
-              <a:t>13.12.2022</a:t>
+              <a:t>14.1.2023</a:t>
             </a:fld>
             <a:endParaRPr lang="en-GB" dirty="0"/>
           </a:p>
@@ -6677,7 +6677,7 @@
           <a:p>
             <a:fld id="{45F98643-D206-614D-B596-3C8548138211}" type="datetime1">
               <a:rPr lang="fi-FI" smtClean="0"/>
-              <a:t>13.12.2022</a:t>
+              <a:t>14.1.2023</a:t>
             </a:fld>
             <a:endParaRPr lang="en-GB" dirty="0"/>
           </a:p>
@@ -7289,7 +7289,7 @@
           <a:p>
             <a:r>
               <a:rPr lang="en-GB" dirty="0"/>
-              <a:t>How to make student projects efficient and enjoyable</a:t>
+              <a:t>How to make student etc. projects efficient and enjoyable</a:t>
             </a:r>
           </a:p>
         </p:txBody>
@@ -7317,7 +7317,7 @@
           <a:p>
             <a:fld id="{30BF63A1-919F-FB49-ABA8-182126D24C50}" type="datetime1">
               <a:rPr lang="fi-FI" smtClean="0"/>
-              <a:t>13.12.2022</a:t>
+              <a:t>14.1.2023</a:t>
             </a:fld>
             <a:endParaRPr lang="en-GB" dirty="0"/>
           </a:p>
@@ -7403,72 +7403,24 @@
           <a:lstStyle/>
           <a:p>
             <a:r>
-              <a:rPr lang="fi-FI" dirty="0"/>
+              <a:rPr lang="en-US" dirty="0"/>
               <a:t>How </a:t>
             </a:r>
             <a:r>
-              <a:rPr lang="fi-FI" dirty="0" err="1"/>
+              <a:rPr lang="en-US" dirty="0" err="1"/>
               <a:t>Softala</a:t>
             </a:r>
             <a:r>
-              <a:rPr lang="fi-FI" dirty="0"/>
-              <a:t> etc. </a:t>
-            </a:r>
-            <a:r>
-              <a:rPr lang="fi-FI" dirty="0" err="1"/>
-              <a:t>school</a:t>
-            </a:r>
-            <a:r>
-              <a:rPr lang="fi-FI" dirty="0"/>
-              <a:t> </a:t>
-            </a:r>
-            <a:r>
-              <a:rPr lang="fi-FI" dirty="0" err="1"/>
-              <a:t>projects</a:t>
-            </a:r>
-            <a:r>
-              <a:rPr lang="fi-FI" dirty="0"/>
-              <a:t> </a:t>
-            </a:r>
-            <a:r>
-              <a:rPr lang="fi-FI" dirty="0" err="1"/>
+              <a:rPr lang="en-US" dirty="0"/>
+              <a:t> etc. school projects </a:t>
+            </a:r>
+            <a:r>
+              <a:rPr lang="en-US" u="sng" dirty="0"/>
               <a:t>differ</a:t>
             </a:r>
             <a:r>
-              <a:rPr lang="fi-FI" dirty="0"/>
-              <a:t> </a:t>
-            </a:r>
-            <a:r>
-              <a:rPr lang="fi-FI" dirty="0" err="1"/>
-              <a:t>from</a:t>
-            </a:r>
-            <a:r>
-              <a:rPr lang="fi-FI" dirty="0"/>
-              <a:t> </a:t>
-            </a:r>
-            <a:r>
-              <a:rPr lang="fi-FI" dirty="0" err="1"/>
-              <a:t>the</a:t>
-            </a:r>
-            <a:r>
-              <a:rPr lang="fi-FI" dirty="0"/>
-              <a:t> </a:t>
-            </a:r>
-            <a:r>
-              <a:rPr lang="fi-FI" dirty="0" err="1"/>
-              <a:t>usual</a:t>
-            </a:r>
-            <a:r>
-              <a:rPr lang="fi-FI" dirty="0"/>
-              <a:t> </a:t>
-            </a:r>
-            <a:r>
-              <a:rPr lang="fi-FI" dirty="0" err="1"/>
-              <a:t>ones</a:t>
-            </a:r>
-            <a:r>
-              <a:rPr lang="fi-FI" dirty="0"/>
-              <a:t> in business</a:t>
+              <a:rPr lang="en-US" dirty="0"/>
+              <a:t> from the usual ones in business</a:t>
             </a:r>
           </a:p>
         </p:txBody>
@@ -7492,7 +7444,7 @@
         <p:spPr/>
         <p:txBody>
           <a:bodyPr>
-            <a:normAutofit fontScale="92500"/>
+            <a:normAutofit lnSpcReduction="10000"/>
           </a:bodyPr>
           <a:lstStyle/>
           <a:p>
@@ -7502,82 +7454,9 @@
               </a:lnSpc>
             </a:pPr>
             <a:r>
-              <a:rPr lang="fi-FI" sz="2800" dirty="0" err="1"/>
-              <a:t>The</a:t>
-            </a:r>
-            <a:r>
-              <a:rPr lang="fi-FI" sz="2800" dirty="0"/>
-              <a:t> </a:t>
-            </a:r>
-            <a:r>
-              <a:rPr lang="fi-FI" sz="2800" dirty="0" err="1"/>
-              <a:t>teams</a:t>
-            </a:r>
-            <a:r>
-              <a:rPr lang="fi-FI" sz="2800" dirty="0"/>
-              <a:t> </a:t>
-            </a:r>
-            <a:r>
-              <a:rPr lang="fi-FI" sz="2800" dirty="0" err="1"/>
-              <a:t>are</a:t>
-            </a:r>
-            <a:r>
-              <a:rPr lang="fi-FI" sz="2800" dirty="0"/>
-              <a:t> </a:t>
-            </a:r>
-            <a:r>
-              <a:rPr lang="fi-FI" sz="2800" dirty="0" err="1"/>
-              <a:t>comparably</a:t>
-            </a:r>
-            <a:r>
-              <a:rPr lang="fi-FI" sz="2800" dirty="0"/>
-              <a:t> </a:t>
-            </a:r>
-            <a:r>
-              <a:rPr lang="fi-FI" sz="2800" dirty="0" err="1"/>
-              <a:t>bigger</a:t>
-            </a:r>
-            <a:r>
-              <a:rPr lang="fi-FI" sz="2800" dirty="0"/>
-              <a:t> </a:t>
-            </a:r>
-            <a:r>
-              <a:rPr lang="fi-FI" sz="2800" dirty="0" err="1"/>
-              <a:t>than</a:t>
-            </a:r>
-            <a:r>
-              <a:rPr lang="fi-FI" sz="2800" dirty="0"/>
-              <a:t> </a:t>
-            </a:r>
-            <a:r>
-              <a:rPr lang="fi-FI" sz="2800" dirty="0" err="1"/>
-              <a:t>would</a:t>
-            </a:r>
-            <a:r>
-              <a:rPr lang="fi-FI" sz="2800" dirty="0"/>
-              <a:t> </a:t>
-            </a:r>
-            <a:r>
-              <a:rPr lang="fi-FI" sz="2800" dirty="0" err="1"/>
-              <a:t>be</a:t>
-            </a:r>
-            <a:r>
-              <a:rPr lang="fi-FI" sz="2800" dirty="0"/>
-              <a:t> set in </a:t>
-            </a:r>
-            <a:r>
-              <a:rPr lang="fi-FI" sz="2800" dirty="0" err="1"/>
-              <a:t>real</a:t>
-            </a:r>
-            <a:r>
-              <a:rPr lang="fi-FI" sz="2800" dirty="0"/>
-              <a:t> SW </a:t>
-            </a:r>
-            <a:r>
-              <a:rPr lang="fi-FI" sz="2800" dirty="0" err="1"/>
-              <a:t>firms</a:t>
-            </a:r>
-            <a:endParaRPr lang="fi-FI" sz="2800" dirty="0"/>
+              <a:rPr lang="en-US" sz="2800" dirty="0"/>
+              <a:t>The teams are comparably bigger than would be set in real SW firms</a:t>
+            </a:r>
           </a:p>
           <a:p>
             <a:pPr>
@@ -7586,94 +7465,9 @@
               </a:lnSpc>
             </a:pPr>
             <a:r>
-              <a:rPr lang="fi-FI" sz="2800" dirty="0"/>
-              <a:t>Even </a:t>
-            </a:r>
-            <a:r>
-              <a:rPr lang="fi-FI" sz="2800" dirty="0" err="1"/>
-              <a:t>if</a:t>
-            </a:r>
-            <a:r>
-              <a:rPr lang="fi-FI" sz="2800" dirty="0"/>
-              <a:t> </a:t>
-            </a:r>
-            <a:r>
-              <a:rPr lang="fi-FI" sz="2800" dirty="0" err="1"/>
-              <a:t>all</a:t>
-            </a:r>
-            <a:r>
-              <a:rPr lang="fi-FI" sz="2800" dirty="0"/>
-              <a:t> ICT </a:t>
-            </a:r>
-            <a:r>
-              <a:rPr lang="fi-FI" sz="2800" dirty="0" err="1"/>
-              <a:t>work</a:t>
-            </a:r>
-            <a:r>
-              <a:rPr lang="fi-FI" sz="2800" dirty="0"/>
-              <a:t> is </a:t>
-            </a:r>
-            <a:r>
-              <a:rPr lang="fi-FI" sz="2800" dirty="0" err="1"/>
-              <a:t>basically</a:t>
-            </a:r>
-            <a:r>
-              <a:rPr lang="fi-FI" sz="2800" dirty="0"/>
-              <a:t> </a:t>
-            </a:r>
-            <a:r>
-              <a:rPr lang="fi-FI" sz="2800" dirty="0" err="1"/>
-              <a:t>learning</a:t>
-            </a:r>
-            <a:r>
-              <a:rPr lang="fi-FI" sz="2800" dirty="0"/>
-              <a:t> </a:t>
-            </a:r>
-            <a:r>
-              <a:rPr lang="fi-FI" sz="2800" dirty="0" err="1"/>
-              <a:t>or</a:t>
-            </a:r>
-            <a:r>
-              <a:rPr lang="fi-FI" sz="2800" dirty="0"/>
-              <a:t> </a:t>
-            </a:r>
-            <a:r>
-              <a:rPr lang="fi-FI" sz="2800" dirty="0" err="1"/>
-              <a:t>finding</a:t>
-            </a:r>
-            <a:r>
-              <a:rPr lang="fi-FI" sz="2800" dirty="0"/>
-              <a:t> out, </a:t>
-            </a:r>
-            <a:r>
-              <a:rPr lang="fi-FI" sz="2800" dirty="0" err="1"/>
-              <a:t>here</a:t>
-            </a:r>
-            <a:r>
-              <a:rPr lang="fi-FI" sz="2800" dirty="0"/>
-              <a:t> </a:t>
-            </a:r>
-            <a:r>
-              <a:rPr lang="fi-FI" sz="2800" dirty="0" err="1"/>
-              <a:t>even</a:t>
-            </a:r>
-            <a:r>
-              <a:rPr lang="fi-FI" sz="2800" dirty="0"/>
-              <a:t> </a:t>
-            </a:r>
-            <a:r>
-              <a:rPr lang="fi-FI" sz="2800" dirty="0" err="1"/>
-              <a:t>more</a:t>
-            </a:r>
-            <a:r>
-              <a:rPr lang="fi-FI" sz="2800" dirty="0"/>
-              <a:t> </a:t>
-            </a:r>
-            <a:r>
-              <a:rPr lang="fi-FI" sz="2800" dirty="0" err="1"/>
-              <a:t>so</a:t>
-            </a:r>
-            <a:endParaRPr lang="fi-FI" sz="2800" dirty="0"/>
+              <a:rPr lang="en-US" sz="2800" dirty="0"/>
+              <a:t>Even if ICT work often is learning and research, here even more so</a:t>
+            </a:r>
           </a:p>
           <a:p>
             <a:pPr>
@@ -7682,52 +7476,8 @@
               </a:lnSpc>
             </a:pPr>
             <a:r>
-              <a:rPr lang="fi-FI" sz="2800" dirty="0" err="1"/>
-              <a:t>There</a:t>
-            </a:r>
-            <a:r>
-              <a:rPr lang="fi-FI" sz="2800" dirty="0"/>
-              <a:t> is </a:t>
-            </a:r>
-            <a:r>
-              <a:rPr lang="fi-FI" sz="2800" dirty="0" err="1"/>
-              <a:t>usually</a:t>
-            </a:r>
-            <a:r>
-              <a:rPr lang="fi-FI" sz="2800" dirty="0"/>
-              <a:t> no </a:t>
-            </a:r>
-            <a:r>
-              <a:rPr lang="fi-FI" sz="2800" dirty="0" err="1"/>
-              <a:t>product</a:t>
-            </a:r>
-            <a:r>
-              <a:rPr lang="fi-FI" sz="2800" dirty="0"/>
-              <a:t> </a:t>
-            </a:r>
-            <a:r>
-              <a:rPr lang="fi-FI" sz="2800" dirty="0" err="1"/>
-              <a:t>running</a:t>
-            </a:r>
-            <a:r>
-              <a:rPr lang="fi-FI" sz="2800" dirty="0"/>
-              <a:t> in ”</a:t>
-            </a:r>
-            <a:r>
-              <a:rPr lang="fi-FI" sz="2800" dirty="0" err="1"/>
-              <a:t>production</a:t>
-            </a:r>
-            <a:r>
-              <a:rPr lang="fi-FI" sz="2800" dirty="0"/>
-              <a:t> </a:t>
-            </a:r>
-            <a:r>
-              <a:rPr lang="fi-FI" sz="2800" dirty="0" err="1"/>
-              <a:t>environment</a:t>
-            </a:r>
-            <a:r>
-              <a:rPr lang="fi-FI" sz="2800" dirty="0"/>
-              <a:t>”</a:t>
+              <a:rPr lang="en-US" sz="2800" dirty="0"/>
+              <a:t>We usually have no product running in ”production environment”</a:t>
             </a:r>
           </a:p>
           <a:p>
@@ -7737,140 +7487,8 @@
               </a:lnSpc>
             </a:pPr>
             <a:r>
-              <a:rPr lang="fi-FI" sz="2800" dirty="0" err="1"/>
-              <a:t>Other</a:t>
-            </a:r>
-            <a:r>
-              <a:rPr lang="fi-FI" sz="2800" dirty="0"/>
-              <a:t> </a:t>
-            </a:r>
-            <a:r>
-              <a:rPr lang="fi-FI" sz="2800" dirty="0" err="1"/>
-              <a:t>members</a:t>
-            </a:r>
-            <a:r>
-              <a:rPr lang="fi-FI" sz="2800" dirty="0"/>
-              <a:t> </a:t>
-            </a:r>
-            <a:r>
-              <a:rPr lang="fi-FI" sz="2800" dirty="0" err="1"/>
-              <a:t>need</a:t>
-            </a:r>
-            <a:r>
-              <a:rPr lang="fi-FI" sz="2800" dirty="0"/>
-              <a:t> </a:t>
-            </a:r>
-            <a:r>
-              <a:rPr lang="fi-FI" sz="2800" dirty="0" err="1"/>
-              <a:t>your</a:t>
-            </a:r>
-            <a:r>
-              <a:rPr lang="fi-FI" sz="2800" dirty="0"/>
-              <a:t> </a:t>
-            </a:r>
-            <a:r>
-              <a:rPr lang="fi-FI" sz="2800" dirty="0" err="1"/>
-              <a:t>contribution</a:t>
-            </a:r>
-            <a:r>
-              <a:rPr lang="fi-FI" sz="2800" dirty="0"/>
-              <a:t> </a:t>
-            </a:r>
-            <a:r>
-              <a:rPr lang="fi-FI" sz="2800" dirty="0" err="1"/>
-              <a:t>faster</a:t>
-            </a:r>
-            <a:r>
-              <a:rPr lang="fi-FI" sz="2800" dirty="0"/>
-              <a:t> </a:t>
-            </a:r>
-            <a:r>
-              <a:rPr lang="fi-FI" sz="2800" dirty="0" err="1"/>
-              <a:t>than</a:t>
-            </a:r>
-            <a:r>
-              <a:rPr lang="fi-FI" sz="2800" dirty="0"/>
-              <a:t> </a:t>
-            </a:r>
-            <a:r>
-              <a:rPr lang="fi-FI" sz="2800" dirty="0" err="1"/>
-              <a:t>normally</a:t>
-            </a:r>
-            <a:r>
-              <a:rPr lang="fi-FI" sz="2800" dirty="0"/>
-              <a:t> (</a:t>
-            </a:r>
-            <a:r>
-              <a:rPr lang="fi-FI" sz="2800" dirty="0" err="1"/>
-              <a:t>the</a:t>
-            </a:r>
-            <a:r>
-              <a:rPr lang="fi-FI" sz="2800" dirty="0"/>
-              <a:t> </a:t>
-            </a:r>
-            <a:r>
-              <a:rPr lang="fi-FI" sz="2800" dirty="0" err="1"/>
-              <a:t>architecture</a:t>
-            </a:r>
-            <a:r>
-              <a:rPr lang="fi-FI" sz="2800" dirty="0"/>
-              <a:t>, </a:t>
-            </a:r>
-            <a:r>
-              <a:rPr lang="fi-FI" sz="2800" dirty="0" err="1"/>
-              <a:t>folder</a:t>
-            </a:r>
-            <a:r>
-              <a:rPr lang="fi-FI" sz="2800" dirty="0"/>
-              <a:t> and </a:t>
-            </a:r>
-            <a:r>
-              <a:rPr lang="fi-FI" sz="2800" dirty="0" err="1"/>
-              <a:t>file</a:t>
-            </a:r>
-            <a:r>
-              <a:rPr lang="fi-FI" sz="2800" dirty="0"/>
-              <a:t> </a:t>
-            </a:r>
-            <a:r>
-              <a:rPr lang="fi-FI" sz="2800" dirty="0" err="1"/>
-              <a:t>structure</a:t>
-            </a:r>
-            <a:r>
-              <a:rPr lang="fi-FI" sz="2800" dirty="0"/>
-              <a:t>, </a:t>
-            </a:r>
-            <a:r>
-              <a:rPr lang="fi-FI" sz="2800" dirty="0" err="1"/>
-              <a:t>frontend</a:t>
-            </a:r>
-            <a:r>
-              <a:rPr lang="fi-FI" sz="2800" dirty="0"/>
-              <a:t> </a:t>
-            </a:r>
-            <a:r>
-              <a:rPr lang="fi-FI" sz="2800" dirty="0" err="1"/>
-              <a:t>routing</a:t>
-            </a:r>
-            <a:r>
-              <a:rPr lang="fi-FI" sz="2800" dirty="0"/>
-              <a:t>,  API </a:t>
-            </a:r>
-            <a:r>
-              <a:rPr lang="fi-FI" sz="2800" dirty="0" err="1"/>
-              <a:t>end</a:t>
-            </a:r>
-            <a:r>
-              <a:rPr lang="fi-FI" sz="2800" dirty="0"/>
-              <a:t> </a:t>
-            </a:r>
-            <a:r>
-              <a:rPr lang="fi-FI" sz="2800" dirty="0" err="1"/>
-              <a:t>points</a:t>
-            </a:r>
-            <a:r>
-              <a:rPr lang="fi-FI" sz="2800" dirty="0"/>
-              <a:t>, … )</a:t>
+              <a:rPr lang="en-US" sz="2800" dirty="0"/>
+              <a:t>Other members need your contribution faster than normally (the architecture, folder and file structure, frontend routing,  API end points, access management, … )</a:t>
             </a:r>
           </a:p>
           <a:p>
@@ -7880,98 +7498,9 @@
               </a:lnSpc>
             </a:pPr>
             <a:r>
-              <a:rPr lang="fi-FI" sz="2800" dirty="0" err="1"/>
-              <a:t>Students</a:t>
-            </a:r>
-            <a:r>
-              <a:rPr lang="fi-FI" sz="2800" dirty="0"/>
-              <a:t> </a:t>
-            </a:r>
-            <a:r>
-              <a:rPr lang="fi-FI" sz="2800" dirty="0" err="1"/>
-              <a:t>are</a:t>
-            </a:r>
-            <a:r>
-              <a:rPr lang="fi-FI" sz="2800" dirty="0"/>
-              <a:t> </a:t>
-            </a:r>
-            <a:r>
-              <a:rPr lang="fi-FI" sz="2800" dirty="0" err="1"/>
-              <a:t>not</a:t>
-            </a:r>
-            <a:r>
-              <a:rPr lang="fi-FI" sz="2800" dirty="0"/>
-              <a:t> </a:t>
-            </a:r>
-            <a:r>
-              <a:rPr lang="fi-FI" sz="2800" dirty="0" err="1"/>
-              <a:t>working</a:t>
-            </a:r>
-            <a:r>
-              <a:rPr lang="fi-FI" sz="2800" dirty="0"/>
-              <a:t> </a:t>
-            </a:r>
-            <a:r>
-              <a:rPr lang="fi-FI" sz="2800" dirty="0" err="1"/>
-              <a:t>full</a:t>
-            </a:r>
-            <a:r>
-              <a:rPr lang="fi-FI" sz="2800" dirty="0"/>
-              <a:t> </a:t>
-            </a:r>
-            <a:r>
-              <a:rPr lang="fi-FI" sz="2800" dirty="0" err="1"/>
-              <a:t>time</a:t>
-            </a:r>
-            <a:r>
-              <a:rPr lang="fi-FI" sz="2800" dirty="0"/>
-              <a:t> for </a:t>
-            </a:r>
-            <a:r>
-              <a:rPr lang="fi-FI" sz="2800" dirty="0" err="1"/>
-              <a:t>that</a:t>
-            </a:r>
-            <a:r>
-              <a:rPr lang="fi-FI" sz="2800" dirty="0"/>
-              <a:t> </a:t>
-            </a:r>
-            <a:r>
-              <a:rPr lang="fi-FI" sz="2800" dirty="0" err="1"/>
-              <a:t>project</a:t>
-            </a:r>
-            <a:r>
-              <a:rPr lang="fi-FI" sz="2800" dirty="0"/>
-              <a:t> </a:t>
-            </a:r>
-            <a:r>
-              <a:rPr lang="fi-FI" sz="2800" dirty="0" err="1"/>
-              <a:t>nor</a:t>
-            </a:r>
-            <a:r>
-              <a:rPr lang="fi-FI" sz="2800" dirty="0"/>
-              <a:t> </a:t>
-            </a:r>
-            <a:r>
-              <a:rPr lang="fi-FI" sz="2800" dirty="0" err="1"/>
-              <a:t>that</a:t>
-            </a:r>
-            <a:r>
-              <a:rPr lang="fi-FI" sz="2800" dirty="0"/>
-              <a:t> </a:t>
-            </a:r>
-            <a:r>
-              <a:rPr lang="fi-FI" sz="2800" dirty="0" err="1"/>
-              <a:t>tech</a:t>
-            </a:r>
-            <a:r>
-              <a:rPr lang="fi-FI" sz="2800" dirty="0"/>
-              <a:t> </a:t>
-            </a:r>
-            <a:r>
-              <a:rPr lang="fi-FI" sz="2800" dirty="0" err="1"/>
-              <a:t>stack</a:t>
-            </a:r>
-            <a:endParaRPr lang="fi-FI" sz="2800" dirty="0"/>
+              <a:rPr lang="en-US" sz="2800" dirty="0"/>
+              <a:t>Students are not working fulltime for this project nor this tech stack</a:t>
+            </a:r>
           </a:p>
           <a:p>
             <a:pPr>
@@ -7980,100 +7509,16 @@
               </a:lnSpc>
             </a:pPr>
             <a:r>
-              <a:rPr lang="fi-FI" sz="2800" dirty="0" err="1"/>
-              <a:t>Students</a:t>
-            </a:r>
-            <a:r>
-              <a:rPr lang="fi-FI" sz="2800" dirty="0"/>
-              <a:t> </a:t>
-            </a:r>
-            <a:r>
-              <a:rPr lang="fi-FI" sz="2800" dirty="0" err="1"/>
-              <a:t>do</a:t>
-            </a:r>
-            <a:r>
-              <a:rPr lang="fi-FI" sz="2800" dirty="0"/>
-              <a:t> </a:t>
-            </a:r>
-            <a:r>
-              <a:rPr lang="fi-FI" sz="2800" dirty="0" err="1"/>
-              <a:t>more</a:t>
-            </a:r>
-            <a:r>
-              <a:rPr lang="fi-FI" sz="2800" dirty="0"/>
-              <a:t> </a:t>
-            </a:r>
-            <a:r>
-              <a:rPr lang="fi-FI" sz="2800" dirty="0" err="1"/>
-              <a:t>roles</a:t>
-            </a:r>
-            <a:r>
-              <a:rPr lang="fi-FI" sz="2800" dirty="0"/>
-              <a:t> </a:t>
-            </a:r>
-            <a:r>
-              <a:rPr lang="fi-FI" sz="2800" dirty="0" err="1"/>
-              <a:t>than</a:t>
-            </a:r>
-            <a:r>
-              <a:rPr lang="fi-FI" sz="2800" dirty="0"/>
-              <a:t> SW </a:t>
-            </a:r>
-            <a:r>
-              <a:rPr lang="fi-FI" sz="2800" dirty="0" err="1"/>
-              <a:t>developers</a:t>
-            </a:r>
-            <a:r>
-              <a:rPr lang="fi-FI" sz="2800" dirty="0"/>
-              <a:t> </a:t>
-            </a:r>
-            <a:r>
-              <a:rPr lang="fi-FI" sz="2800" i="1" dirty="0" err="1"/>
+              <a:rPr lang="en-US" sz="2800" dirty="0"/>
+              <a:t>Students do more roles than SW developers </a:t>
+            </a:r>
+            <a:r>
+              <a:rPr lang="en-US" sz="2800" i="1" dirty="0"/>
               <a:t>typically</a:t>
             </a:r>
             <a:r>
-              <a:rPr lang="fi-FI" sz="2800" dirty="0"/>
-              <a:t> </a:t>
-            </a:r>
-            <a:r>
-              <a:rPr lang="fi-FI" sz="2800" dirty="0" err="1"/>
-              <a:t>do</a:t>
-            </a:r>
-            <a:r>
-              <a:rPr lang="fi-FI" sz="2800" dirty="0"/>
-              <a:t>. (</a:t>
-            </a:r>
-            <a:r>
-              <a:rPr lang="fi-FI" sz="2800" dirty="0" err="1"/>
-              <a:t>incl</a:t>
-            </a:r>
-            <a:r>
-              <a:rPr lang="fi-FI" sz="2800" dirty="0"/>
-              <a:t>. Product </a:t>
-            </a:r>
-            <a:r>
-              <a:rPr lang="fi-FI" sz="2800" dirty="0" err="1"/>
-              <a:t>Owner</a:t>
-            </a:r>
-            <a:r>
-              <a:rPr lang="fi-FI" sz="2800" dirty="0"/>
-              <a:t>, Product and UX design, </a:t>
-            </a:r>
-            <a:r>
-              <a:rPr lang="fi-FI" sz="2800" dirty="0" err="1"/>
-              <a:t>customer</a:t>
-            </a:r>
-            <a:r>
-              <a:rPr lang="fi-FI" sz="2800" dirty="0"/>
-              <a:t> </a:t>
-            </a:r>
-            <a:r>
-              <a:rPr lang="fi-FI" sz="2800" dirty="0" err="1"/>
-              <a:t>contacts</a:t>
-            </a:r>
-            <a:r>
-              <a:rPr lang="fi-FI" sz="2800" dirty="0"/>
-              <a:t>)</a:t>
+              <a:rPr lang="en-US" sz="2800" dirty="0"/>
+              <a:t> do. (incl. Product Owner, Product and UX design, customer contact)</a:t>
             </a:r>
           </a:p>
         </p:txBody>
@@ -8101,7 +7546,7 @@
           <a:p>
             <a:fld id="{202E1EC2-47B8-044B-A09E-6A63B4D80C87}" type="datetime1">
               <a:rPr lang="fi-FI" smtClean="0"/>
-              <a:t>13.12.2022</a:t>
+              <a:t>14.1.2023</a:t>
             </a:fld>
             <a:endParaRPr lang="en-GB"/>
           </a:p>
@@ -8220,34 +7665,9 @@
           <a:lstStyle/>
           <a:p>
             <a:r>
-              <a:rPr lang="fi-FI" sz="3500" dirty="0" err="1"/>
-              <a:t>The</a:t>
-            </a:r>
-            <a:r>
-              <a:rPr lang="fi-FI" sz="3500" dirty="0"/>
-              <a:t> </a:t>
-            </a:r>
-            <a:r>
-              <a:rPr lang="fi-FI" sz="3500" dirty="0" err="1"/>
-              <a:t>goals</a:t>
-            </a:r>
-            <a:r>
-              <a:rPr lang="fi-FI" sz="3500" dirty="0"/>
-              <a:t> in </a:t>
-            </a:r>
-            <a:r>
-              <a:rPr lang="fi-FI" sz="3500" dirty="0" err="1"/>
-              <a:t>our</a:t>
-            </a:r>
-            <a:r>
-              <a:rPr lang="fi-FI" sz="3500" dirty="0"/>
-              <a:t> </a:t>
-            </a:r>
-            <a:r>
-              <a:rPr lang="fi-FI" sz="3500" dirty="0" err="1"/>
-              <a:t>projects</a:t>
-            </a:r>
-            <a:endParaRPr lang="fi-FI" sz="3500" dirty="0"/>
+              <a:rPr lang="en-US" sz="3500" dirty="0"/>
+              <a:t>The goals in our projects</a:t>
+            </a:r>
           </a:p>
         </p:txBody>
       </p:sp>
@@ -8284,7 +7704,7 @@
             </a:pPr>
             <a:r>
               <a:rPr lang="en-US" dirty="0"/>
-              <a:t>Basically you want to create a “well-oiled machine” or  “heavy but steady train” that slowly but inevitably starts to produce results, </a:t>
+              <a:t>Fundamentally you want to create a “well-oiled machine” or “heavy but steady train” that slowly but inevitably starts to produce results, </a:t>
             </a:r>
             <a:r>
               <a:rPr lang="en-US" b="1" dirty="0"/>
@@ -8294,19 +7714,25 @@
           <a:p>
             <a:r>
               <a:rPr lang="en-US" dirty="0"/>
-              <a:t>It’s also important to have enjoyable challenging environment, where the pressure is manageable and will not cause stress</a:t>
+              <a:t>It’s also important to have enjoyable challenging environment, where the pressure is manageable and will not cause prolonged stress</a:t>
             </a:r>
           </a:p>
           <a:p>
             <a:r>
               <a:rPr lang="en-US" dirty="0"/>
-              <a:t>We want to make the mistakes here you don’t want to do in your first job!</a:t>
+              <a:t>We want to make the mistakes here that you don’t want to do in your first job!</a:t>
             </a:r>
           </a:p>
           <a:p>
             <a:r>
               <a:rPr lang="en-US" dirty="0"/>
-              <a:t>Most important is not the product, but developing the process/project so that your next project would start </a:t>
+              <a:t>You want to start your career project later with skills, knowledge, experience and a slightly thicker skin. </a:t>
+            </a:r>
+          </a:p>
+          <a:p>
+            <a:r>
+              <a:rPr lang="en-US" dirty="0"/>
+              <a:t>Thus the only important thing is not the product, but developing the process/project so that your next project would start </a:t>
             </a:r>
             <a:r>
               <a:rPr lang="en-US" dirty="0" err="1"/>
@@ -8318,7 +7744,7 @@
             <a:pPr lvl="1"/>
             <a:r>
               <a:rPr lang="en-US" dirty="0"/>
-              <a:t>Of course if that is really successful you have a good version of the product at the end of the project. Good sound first version of the product but not the best.</a:t>
+              <a:t>Of course if that is really successful you have a good version of the product at the end of the project. Good sound first version of the product but not the best. </a:t>
             </a:r>
           </a:p>
           <a:p>
@@ -8328,7 +7754,11 @@
             </a:r>
           </a:p>
           <a:p>
-            <a:endParaRPr lang="en-US" dirty="0"/>
+            <a:pPr lvl="1"/>
+            <a:r>
+              <a:rPr lang="en-US" dirty="0"/>
+              <a:t>The product is also a test of the project process’ maturity</a:t>
+            </a:r>
           </a:p>
         </p:txBody>
       </p:sp>
@@ -8355,7 +7785,7 @@
           <a:p>
             <a:fld id="{202E1EC2-47B8-044B-A09E-6A63B4D80C87}" type="datetime1">
               <a:rPr lang="fi-FI" smtClean="0"/>
-              <a:t>13.12.2022</a:t>
+              <a:t>14.1.2023</a:t>
             </a:fld>
             <a:endParaRPr lang="en-GB"/>
           </a:p>
@@ -8474,58 +7904,17 @@
           <a:lstStyle/>
           <a:p>
             <a:r>
-              <a:rPr lang="fi-FI" sz="3500" dirty="0" err="1"/>
-              <a:t>These</a:t>
-            </a:r>
-            <a:r>
-              <a:rPr lang="fi-FI" sz="3500" dirty="0"/>
-              <a:t> </a:t>
-            </a:r>
-            <a:r>
-              <a:rPr lang="fi-FI" sz="3500" dirty="0" err="1"/>
-              <a:t>could</a:t>
-            </a:r>
-            <a:r>
-              <a:rPr lang="fi-FI" sz="3500" dirty="0"/>
-              <a:t> </a:t>
-            </a:r>
-            <a:r>
-              <a:rPr lang="fi-FI" sz="3500" dirty="0" err="1"/>
-              <a:t>make</a:t>
-            </a:r>
-            <a:r>
-              <a:rPr lang="fi-FI" sz="3500" dirty="0"/>
-              <a:t> </a:t>
-            </a:r>
-            <a:r>
-              <a:rPr lang="fi-FI" sz="3500" dirty="0" err="1"/>
-              <a:t>our</a:t>
-            </a:r>
-            <a:r>
-              <a:rPr lang="fi-FI" sz="3500" dirty="0"/>
-              <a:t> </a:t>
-            </a:r>
-            <a:r>
-              <a:rPr lang="fi-FI" sz="3500" dirty="0" err="1"/>
-              <a:t>projects</a:t>
-            </a:r>
-            <a:r>
-              <a:rPr lang="fi-FI" sz="3500" dirty="0"/>
-              <a:t> </a:t>
-            </a:r>
-            <a:r>
-              <a:rPr lang="fi-FI" sz="3500" dirty="0" err="1"/>
-              <a:t>efficient</a:t>
-            </a:r>
-            <a:r>
-              <a:rPr lang="fi-FI" sz="3500" dirty="0"/>
-              <a:t> &amp; </a:t>
-            </a:r>
-            <a:r>
-              <a:rPr lang="fi-FI" sz="3500" dirty="0" err="1"/>
-              <a:t>enjoyable</a:t>
-            </a:r>
-            <a:endParaRPr lang="fi-FI" sz="3500" dirty="0"/>
+              <a:rPr lang="en-US" sz="3500" dirty="0"/>
+              <a:t>These </a:t>
+            </a:r>
+            <a:r>
+              <a:rPr lang="en-US" sz="3500" u="sng" dirty="0"/>
+              <a:t>factors</a:t>
+            </a:r>
+            <a:r>
+              <a:rPr lang="en-US" sz="3500" dirty="0"/>
+              <a:t> make our project efficient &amp; enjoyable</a:t>
+            </a:r>
           </a:p>
         </p:txBody>
       </p:sp>
@@ -8574,7 +7963,7 @@
                   <a:srgbClr val="00B050"/>
                 </a:solidFill>
               </a:rPr>
-              <a:t>Also some visually pleasant and intuitive Scrum tool used properly	 </a:t>
+              <a:t>Also use some visually pleasant and intuitive Scrum tool smoothly and coherently	 </a:t>
             </a:r>
           </a:p>
           <a:p>
@@ -8584,7 +7973,7 @@
                   <a:srgbClr val="00B050"/>
                 </a:solidFill>
               </a:rPr>
-              <a:t>Communication and reactions</a:t>
+              <a:t>Communication and reacting</a:t>
             </a:r>
           </a:p>
           <a:p>
@@ -8606,7 +7995,7 @@
                   <a:srgbClr val="00B050"/>
                 </a:solidFill>
               </a:rPr>
-              <a:t>Meeting and file naming. Reactions to someone working at Saturday night.</a:t>
+              <a:t>Meetings and e.g. file naming. Reactions to someone working at Saturday night. etc. …</a:t>
             </a:r>
           </a:p>
           <a:p>
@@ -8666,7 +8055,7 @@
                   <a:srgbClr val="00B050"/>
                 </a:solidFill>
               </a:rPr>
-              <a:t>Courage</a:t>
+              <a:t>Courage and trust</a:t>
             </a:r>
           </a:p>
           <a:p>
@@ -8676,17 +8065,13 @@
                   <a:srgbClr val="00B050"/>
                 </a:solidFill>
               </a:rPr>
-              <a:t>Lean prototyping approach to product development (avoid the “analysis paralysis”)</a:t>
-            </a:r>
-          </a:p>
-          <a:p>
-            <a:r>
-              <a:rPr lang="en-US" i="1" dirty="0" err="1"/>
-              <a:t>Restrospective</a:t>
-            </a:r>
-            <a:r>
-              <a:rPr lang="en-US" i="1" dirty="0"/>
-              <a:t> of all the above (“inspect and adapt”)</a:t>
+              <a:t>Lean prototyping approach to agile product development (avoid the “analysis paralysis”)</a:t>
+            </a:r>
+          </a:p>
+          <a:p>
+            <a:r>
+              <a:rPr lang="en-US" b="1" dirty="0"/>
+              <a:t>Retrospective of all the above (“inspect and adapt”)</a:t>
             </a:r>
           </a:p>
           <a:p>
@@ -8717,7 +8102,7 @@
           <a:p>
             <a:fld id="{202E1EC2-47B8-044B-A09E-6A63B4D80C87}" type="datetime1">
               <a:rPr lang="fi-FI" smtClean="0"/>
-              <a:t>13.12.2022</a:t>
+              <a:t>14.1.2023</a:t>
             </a:fld>
             <a:endParaRPr lang="en-GB"/>
           </a:p>
@@ -8836,10 +8221,9 @@
           <a:lstStyle/>
           <a:p>
             <a:r>
-              <a:rPr lang="fi-FI" sz="3500" dirty="0" err="1"/>
-              <a:t>Scrum</a:t>
-            </a:r>
-            <a:endParaRPr lang="fi-FI" sz="3500" dirty="0"/>
+              <a:rPr lang="en-US" sz="3500" dirty="0"/>
+              <a:t>Scrum running smoothly</a:t>
+            </a:r>
           </a:p>
         </p:txBody>
       </p:sp>
@@ -8879,64 +8263,60 @@
           <a:p>
             <a:pPr lvl="1"/>
             <a:r>
-              <a:rPr lang="en-US" dirty="0">
+              <a:rPr lang="en-US" sz="1400" dirty="0">
                 <a:hlinkClick r:id="rId2"/>
               </a:rPr>
               <a:t>https://github.com/valju/scrum_learning/tree/master/ScrumDrawings</a:t>
             </a:r>
             <a:r>
+              <a:rPr lang="en-US" sz="1400" dirty="0"/>
+              <a:t>      </a:t>
+            </a:r>
+            <a:r>
               <a:rPr lang="en-US" dirty="0"/>
-              <a:t>      git pull the repo and open this folder</a:t>
+              <a:t>git pull that repo and open this folder</a:t>
             </a:r>
           </a:p>
           <a:p>
             <a:pPr lvl="1"/>
             <a:r>
-              <a:rPr lang="en-US" dirty="0">
+              <a:rPr lang="en-US" sz="1200" dirty="0">
                 <a:hlinkClick r:id="rId3"/>
               </a:rPr>
               <a:t>https://github.com/valju/scrum_learning/blob/master/ScrumDrawings/02_AboutScrumRolesAndTasks.pdf</a:t>
             </a:r>
-            <a:endParaRPr lang="en-US" dirty="0"/>
+            <a:endParaRPr lang="en-US" sz="1200" dirty="0"/>
           </a:p>
           <a:p>
             <a:pPr lvl="1"/>
             <a:r>
-              <a:rPr lang="en-US" dirty="0">
+              <a:rPr lang="en-US" sz="1200" dirty="0">
                 <a:hlinkClick r:id="rId4"/>
               </a:rPr>
               <a:t>https://github.com/valju/scrum_learning/blob/master/ScrumDrawings/03_ScrumMeetingTypes_ActionsAndAttendees.pdf</a:t>
             </a:r>
-            <a:endParaRPr lang="en-US" dirty="0"/>
+            <a:endParaRPr lang="en-US" sz="1200" dirty="0"/>
           </a:p>
           <a:p>
             <a:pPr lvl="1"/>
             <a:r>
-              <a:rPr lang="en-US" dirty="0">
+              <a:rPr lang="en-US" sz="1200" dirty="0">
                 <a:hlinkClick r:id="rId5"/>
               </a:rPr>
               <a:t>https://github.com/valju/scrum_learning/blob/master/ScrumDrawings/04b_ScrumSchedule_for_OneWeekSprint_TypicalMiddleOfWeekCloseAndStart.pdf</a:t>
             </a:r>
-            <a:endParaRPr lang="en-US" dirty="0"/>
+            <a:endParaRPr lang="en-US" sz="1200" dirty="0"/>
           </a:p>
           <a:p>
             <a:r>
               <a:rPr lang="en-US" dirty="0"/>
-              <a:t>Scrum understanding and knowledge has to go to a level where at the end nobody even thinks we are using Scrum. Everybody automatically does all things right</a:t>
+              <a:t>Scrum understanding and knowledge has to go to a level where finally nobody even is thinking that we are using Scrum. Everybody just automatically does all things right way.</a:t>
             </a:r>
           </a:p>
           <a:p>
             <a:r>
               <a:rPr lang="en-US" dirty="0"/>
-              <a:t>In the beginning, on the </a:t>
-            </a:r>
-            <a:r>
-              <a:rPr lang="en-US" dirty="0" err="1"/>
-              <a:t>otherhand</a:t>
-            </a:r>
-            <a:r>
-              <a:rPr lang="en-US" dirty="0"/>
-              <a:t>, it’s better to recap e.g. the meeting type before the meeting. What’s done there and what’s NOT done there</a:t>
+              <a:t>In the beginning, on the other hand, it’s better to recap e.g. the meeting type before each meeting. What’s done in that kind of meeting and what’s NOT done there</a:t>
             </a:r>
           </a:p>
           <a:p>
@@ -8968,7 +8348,7 @@
           <a:p>
             <a:fld id="{202E1EC2-47B8-044B-A09E-6A63B4D80C87}" type="datetime1">
               <a:rPr lang="fi-FI" smtClean="0"/>
-              <a:t>13.12.2022</a:t>
+              <a:t>14.1.2023</a:t>
             </a:fld>
             <a:endParaRPr lang="en-GB"/>
           </a:p>
@@ -9127,50 +8507,51 @@
           <a:p>
             <a:r>
               <a:rPr lang="en-US" dirty="0"/>
-              <a:t>E.g.</a:t>
-            </a:r>
+              <a:t>E.g. </a:t>
+            </a:r>
+            <a:r>
+              <a:rPr lang="en-US" sz="2000" dirty="0"/>
+              <a:t>the</a:t>
+            </a:r>
+            <a:r>
+              <a:rPr lang="en-US" dirty="0"/>
+              <a:t> principles of sound architecture, choosing appropriate architecture, principles in SW design, … basically philosophy = ways to affect your thinking automatically</a:t>
+            </a:r>
+            <a:endParaRPr lang="en-US" dirty="0">
+              <a:hlinkClick r:id="rId2"/>
+            </a:endParaRPr>
           </a:p>
           <a:p>
             <a:pPr lvl="1"/>
             <a:r>
-              <a:rPr lang="en-US" dirty="0">
+              <a:rPr lang="en-US" sz="1400" dirty="0">
+                <a:hlinkClick r:id="rId3"/>
+              </a:rPr>
+              <a:t>https://github.com/haagahelia/swd4tn023/blob/master/06_ohjelmistoarkkitehtuurit_ja_patternit/SoftwareArchitecturesAndPatterns.pdf</a:t>
+            </a:r>
+            <a:endParaRPr lang="en-US" sz="1400" dirty="0"/>
+          </a:p>
+          <a:p>
+            <a:r>
+              <a:rPr lang="en-US" sz="1600" dirty="0"/>
+              <a:t>Just one technical example related to architectures</a:t>
+            </a:r>
+            <a:endParaRPr lang="en-US" sz="1400" dirty="0"/>
+          </a:p>
+          <a:p>
+            <a:pPr lvl="1"/>
+            <a:r>
+              <a:rPr lang="en-US" sz="1400" dirty="0">
                 <a:hlinkClick r:id="rId2"/>
               </a:rPr>
-              <a:t>https://github.com/haagahelia/swd4tn023/blob/master/06_ohjelmistoarkkitehtuurit_ja_patternit/SoftwareArchitecturesAndPatterns.pdf</a:t>
-            </a:r>
-            <a:endParaRPr lang="en-US" dirty="0"/>
-          </a:p>
-          <a:p>
-            <a:pPr lvl="2"/>
-            <a:r>
-              <a:rPr lang="en-US" dirty="0"/>
-              <a:t>The principles of sound architecture, choosing appropriate architecture, principles in SW design, … basically philosophy = ways to think automatically</a:t>
-            </a:r>
-            <a:endParaRPr lang="en-US" dirty="0">
-              <a:hlinkClick r:id="rId3"/>
-            </a:endParaRPr>
-          </a:p>
-          <a:p>
-            <a:pPr lvl="1"/>
-            <a:r>
-              <a:rPr lang="en-US" dirty="0">
-                <a:hlinkClick r:id="rId3"/>
-              </a:rPr>
               <a:t>https://github.com/haagahelia/swd4tn023/blob/master/06_ohjelmistoarkkitehtuurit_ja_patternit/uuid.pdf</a:t>
             </a:r>
-            <a:endParaRPr lang="en-US" dirty="0"/>
-          </a:p>
-          <a:p>
-            <a:pPr lvl="2"/>
-            <a:r>
-              <a:rPr lang="en-US" dirty="0"/>
-              <a:t>Just one technical example related to architectures</a:t>
-            </a:r>
-          </a:p>
-          <a:p>
-            <a:r>
-              <a:rPr lang="en-US" dirty="0"/>
-              <a:t>When you digested the correct philosophies you tend to make correct choices without thinking!</a:t>
+            <a:endParaRPr lang="en-US" sz="1400" dirty="0"/>
+          </a:p>
+          <a:p>
+            <a:r>
+              <a:rPr lang="en-US" sz="2000" dirty="0"/>
+              <a:t>When you have digested the correct philosophies you tend to make correct choices without thinking!</a:t>
             </a:r>
           </a:p>
           <a:p>
@@ -9202,7 +8583,7 @@
           <a:p>
             <a:fld id="{202E1EC2-47B8-044B-A09E-6A63B4D80C87}" type="datetime1">
               <a:rPr lang="fi-FI" smtClean="0"/>
-              <a:t>13.12.2022</a:t>
+              <a:t>14.1.2023</a:t>
             </a:fld>
             <a:endParaRPr lang="en-GB"/>
           </a:p>
@@ -9321,14 +8702,10 @@
           <a:lstStyle/>
           <a:p>
             <a:r>
-              <a:rPr lang="fi-FI" sz="3200" dirty="0"/>
-              <a:t>Git </a:t>
-            </a:r>
-            <a:r>
-              <a:rPr lang="fi-FI" sz="3200" dirty="0" err="1"/>
-              <a:t>process</a:t>
-            </a:r>
-            <a:endParaRPr lang="fi-FI" sz="3500" dirty="0"/>
+              <a:rPr lang="en-US" sz="3200" dirty="0"/>
+              <a:t>Git process</a:t>
+            </a:r>
+            <a:endParaRPr lang="en-US" sz="3500" dirty="0"/>
           </a:p>
         </p:txBody>
       </p:sp>
@@ -9362,32 +8739,64 @@
           <a:p>
             <a:r>
               <a:rPr lang="en-US" dirty="0"/>
-              <a:t>E.g.</a:t>
-            </a:r>
-          </a:p>
-          <a:p>
-            <a:pPr lvl="1"/>
-            <a:r>
-              <a:rPr lang="en-US" dirty="0">
+              <a:t>E.g.  </a:t>
+            </a:r>
+            <a:r>
+              <a:rPr lang="en-US" sz="1400" dirty="0">
                 <a:hlinkClick r:id="rId2"/>
               </a:rPr>
               <a:t>https://github.com/haagahelia/swd4tn023/tree/master/03_infra_ja_automaatio/BasicGitBranchingMinimumForBigTeams</a:t>
             </a:r>
             <a:r>
+              <a:rPr lang="en-US" sz="1400" dirty="0"/>
+              <a:t> </a:t>
+            </a:r>
+          </a:p>
+          <a:p>
+            <a:r>
               <a:rPr lang="en-US" dirty="0"/>
-              <a:t> </a:t>
+              <a:t>Four level professional model? (Link in presentation above)</a:t>
             </a:r>
           </a:p>
           <a:p>
             <a:r>
               <a:rPr lang="en-US" dirty="0"/>
-              <a:t>Four level professional model? Or the simplified two level model that has been successfully used in many of our student projects, as it fits possible better our project nature, look at the beginning of </a:t>
-            </a:r>
-            <a:r>
-              <a:rPr lang="en-US"/>
-              <a:t>this slide set </a:t>
-            </a:r>
-            <a:endParaRPr lang="en-US" dirty="0"/>
+              <a:t>Or the simplified two-level model that has been successfully used in many of our student projects, as it fits possible better our project nature. (Look at the pics and docs in the link above)</a:t>
+            </a:r>
+          </a:p>
+          <a:p>
+            <a:r>
+              <a:rPr lang="en-US" dirty="0"/>
+              <a:t>How our school projects differ was handled earlier: </a:t>
+            </a:r>
+          </a:p>
+          <a:p>
+            <a:pPr lvl="1"/>
+            <a:r>
+              <a:rPr lang="en-US" dirty="0"/>
+              <a:t>Often no running production version. </a:t>
+            </a:r>
+          </a:p>
+          <a:p>
+            <a:pPr lvl="1"/>
+            <a:r>
+              <a:rPr lang="en-US" dirty="0"/>
+              <a:t>Often no test branch for separate test team. </a:t>
+            </a:r>
+          </a:p>
+          <a:p>
+            <a:pPr lvl="1"/>
+            <a:r>
+              <a:rPr lang="en-US" dirty="0"/>
+              <a:t>Team needs our common parts contribution published faster, and not hidden in a separate branch for longer.</a:t>
+            </a:r>
+          </a:p>
+          <a:p>
+            <a:pPr lvl="2"/>
+            <a:r>
+              <a:rPr lang="en-US" dirty="0"/>
+              <a:t>Fast integration and sharing even more important than avoiding all problems at any means</a:t>
+            </a:r>
           </a:p>
           <a:p>
             <a:pPr lvl="1"/>
@@ -9418,7 +8827,7 @@
           <a:p>
             <a:fld id="{202E1EC2-47B8-044B-A09E-6A63B4D80C87}" type="datetime1">
               <a:rPr lang="fi-FI" smtClean="0"/>
-              <a:t>13.12.2022</a:t>
+              <a:t>14.1.2023</a:t>
             </a:fld>
             <a:endParaRPr lang="en-GB"/>
           </a:p>
@@ -9577,19 +8986,12 @@
           <a:lstStyle/>
           <a:p>
             <a:r>
-              <a:rPr lang="en-US" dirty="0"/>
-              <a:t>E.g.</a:t>
-            </a:r>
-          </a:p>
-          <a:p>
-            <a:pPr lvl="1"/>
-            <a:r>
-              <a:rPr lang="en-US" dirty="0">
+              <a:rPr lang="en-US" sz="1350" dirty="0">
                 <a:hlinkClick r:id="rId2"/>
               </a:rPr>
               <a:t>https://github.com/haagahelia/swd4tn023/blob/master/06_ohjelmistoarkkitehtuurit_ja_patternit/documentation_principles_for_sw_projects.pdf</a:t>
             </a:r>
-            <a:endParaRPr lang="en-US" dirty="0"/>
+            <a:endParaRPr lang="en-US" sz="1350" dirty="0"/>
           </a:p>
           <a:p>
             <a:r>
@@ -9607,22 +9009,20 @@
             <a:pPr lvl="1"/>
             <a:r>
               <a:rPr lang="en-US" dirty="0"/>
-              <a:t>While learning in school we might do heavy documentation, where the learning process steps are important</a:t>
+              <a:t>While learning in school we might do heavy documentation, where the learning process steps are important. Heavy</a:t>
             </a:r>
           </a:p>
           <a:p>
             <a:pPr lvl="1"/>
             <a:r>
               <a:rPr lang="en-US" dirty="0"/>
-              <a:t>While doing real project we emphasize maintainability and agility also for documentation    </a:t>
-            </a:r>
-          </a:p>
-          <a:p>
-            <a:pPr lvl="1"/>
-            <a:endParaRPr lang="en-US"/>
-          </a:p>
-          <a:p>
-            <a:pPr lvl="1"/>
+              <a:t>While doing real project we emphasize maintainability and agility also for documentation. Lighter    </a:t>
+            </a:r>
+          </a:p>
+          <a:p>
+            <a:pPr marL="504000" lvl="1" indent="0">
+              <a:buNone/>
+            </a:pPr>
             <a:endParaRPr lang="en-US" dirty="0"/>
           </a:p>
           <a:p>
@@ -9675,7 +9075,7 @@
           <a:p>
             <a:fld id="{202E1EC2-47B8-044B-A09E-6A63B4D80C87}" type="datetime1">
               <a:rPr lang="fi-FI" smtClean="0"/>
-              <a:t>13.12.2022</a:t>
+              <a:t>14.1.2023</a:t>
             </a:fld>
             <a:endParaRPr lang="en-GB"/>
           </a:p>
@@ -9802,7 +9202,7 @@
               <a:t> long version of </a:t>
             </a:r>
             <a:r>
-              <a:rPr lang="fi-FI" sz="3500" dirty="0" err="1"/>
+              <a:rPr lang="fi-FI" sz="3500" i="1" dirty="0" err="1"/>
               <a:t>the</a:t>
             </a:r>
             <a:r>
@@ -9869,27 +9269,14 @@
           <a:p>
             <a:r>
               <a:rPr lang="en-US" dirty="0"/>
-              <a:t>Basically nothing earth shaking, but these things require thinking so that we can avoid these pitfalls from the start.</a:t>
+              <a:t>Basically nothing earth-shaking, but these things require thinking and reflecting so that we can avoid these pitfalls from the start.</a:t>
             </a:r>
           </a:p>
           <a:p>
             <a:r>
               <a:rPr lang="en-US" dirty="0"/>
-              <a:t>Not a </a:t>
-            </a:r>
-            <a:r>
-              <a:rPr lang="en-US" dirty="0" err="1"/>
-              <a:t>Pulizer</a:t>
-            </a:r>
-            <a:r>
-              <a:rPr lang="en-US" dirty="0"/>
-              <a:t> price winner, but certainly lists points that some projects </a:t>
-            </a:r>
-            <a:r>
-              <a:rPr lang="en-US"/>
-              <a:t>could have used in past.</a:t>
-            </a:r>
-            <a:endParaRPr lang="en-US" dirty="0"/>
+              <a:t>Not a Pulitzer Prize winner, but certainly lists points that some projects could have used in past.</a:t>
+            </a:r>
           </a:p>
           <a:p>
             <a:r>
@@ -9929,7 +9316,7 @@
           <a:p>
             <a:fld id="{202E1EC2-47B8-044B-A09E-6A63B4D80C87}" type="datetime1">
               <a:rPr lang="fi-FI" smtClean="0"/>
-              <a:t>13.12.2022</a:t>
+              <a:t>14.1.2023</a:t>
             </a:fld>
             <a:endParaRPr lang="en-GB"/>
           </a:p>
@@ -10559,6 +9946,21 @@
 </file>
 
 <file path=customXml/item1.xml><?xml version="1.0" encoding="utf-8"?>
+<p:properties xmlns:p="http://schemas.microsoft.com/office/2006/metadata/properties" xmlns:xsi="http://www.w3.org/2001/XMLSchema-instance" xmlns:pc="http://schemas.microsoft.com/office/infopath/2007/PartnerControls">
+  <documentManagement/>
+</p:properties>
+</file>
+
+<file path=customXml/item2.xml><?xml version="1.0" encoding="utf-8"?>
+<?mso-contentType ?>
+<FormTemplates xmlns="http://schemas.microsoft.com/sharepoint/v3/contenttype/forms">
+  <Display>DocumentLibraryForm</Display>
+  <Edit>DocumentLibraryForm</Edit>
+  <New>DocumentLibraryForm</New>
+</FormTemplates>
+</file>
+
+<file path=customXml/item3.xml><?xml version="1.0" encoding="utf-8"?>
 <ct:contentTypeSchema xmlns:ct="http://schemas.microsoft.com/office/2006/metadata/contentType" xmlns:ma="http://schemas.microsoft.com/office/2006/metadata/properties/metaAttributes" ct:_="" ma:_="" ma:contentTypeName="Document" ma:contentTypeID="0x0101008A03D813BDC1354CB9CC31017C1D507E" ma:contentTypeVersion="14" ma:contentTypeDescription="Create a new document." ma:contentTypeScope="" ma:versionID="8d610081a03aab79f4f6816a8abae875">
   <xsd:schema xmlns:xsd="http://www.w3.org/2001/XMLSchema" xmlns:xs="http://www.w3.org/2001/XMLSchema" xmlns:p="http://schemas.microsoft.com/office/2006/metadata/properties" xmlns:ns3="23ce7308-0f1e-43e9-aba3-b9c7d7318f5c" xmlns:ns4="a915d5db-83f9-4a1c-939a-8e707aa4dcbb" targetNamespace="http://schemas.microsoft.com/office/2006/metadata/properties" ma:root="true" ma:fieldsID="66de0da61abf087c2e24f3b57cbf177f" ns3:_="" ns4:_="">
     <xsd:import namespace="23ce7308-0f1e-43e9-aba3-b9c7d7318f5c"/>
@@ -10787,22 +10189,32 @@
 </ct:contentTypeSchema>
 </file>
 
-<file path=customXml/item2.xml><?xml version="1.0" encoding="utf-8"?>
-<?mso-contentType ?>
-<FormTemplates xmlns="http://schemas.microsoft.com/sharepoint/v3/contenttype/forms">
-  <Display>DocumentLibraryForm</Display>
-  <Edit>DocumentLibraryForm</Edit>
-  <New>DocumentLibraryForm</New>
-</FormTemplates>
+<file path=customXml/itemProps1.xml><?xml version="1.0" encoding="utf-8"?>
+<ds:datastoreItem xmlns:ds="http://schemas.openxmlformats.org/officeDocument/2006/customXml" ds:itemID="{DED4E12E-7268-4B03-A47B-0755D62B5E31}">
+  <ds:schemaRefs>
+    <ds:schemaRef ds:uri="http://purl.org/dc/dcmitype/"/>
+    <ds:schemaRef ds:uri="http://purl.org/dc/elements/1.1/"/>
+    <ds:schemaRef ds:uri="http://www.w3.org/XML/1998/namespace"/>
+    <ds:schemaRef ds:uri="23ce7308-0f1e-43e9-aba3-b9c7d7318f5c"/>
+    <ds:schemaRef ds:uri="http://schemas.microsoft.com/office/2006/metadata/properties"/>
+    <ds:schemaRef ds:uri="http://schemas.microsoft.com/office/2006/documentManagement/types"/>
+    <ds:schemaRef ds:uri="http://schemas.microsoft.com/office/infopath/2007/PartnerControls"/>
+    <ds:schemaRef ds:uri="http://schemas.openxmlformats.org/package/2006/metadata/core-properties"/>
+    <ds:schemaRef ds:uri="a915d5db-83f9-4a1c-939a-8e707aa4dcbb"/>
+    <ds:schemaRef ds:uri="http://purl.org/dc/terms/"/>
+  </ds:schemaRefs>
+</ds:datastoreItem>
 </file>
 
-<file path=customXml/item3.xml><?xml version="1.0" encoding="utf-8"?>
-<p:properties xmlns:p="http://schemas.microsoft.com/office/2006/metadata/properties" xmlns:xsi="http://www.w3.org/2001/XMLSchema-instance" xmlns:pc="http://schemas.microsoft.com/office/infopath/2007/PartnerControls">
-  <documentManagement/>
-</p:properties>
+<file path=customXml/itemProps2.xml><?xml version="1.0" encoding="utf-8"?>
+<ds:datastoreItem xmlns:ds="http://schemas.openxmlformats.org/officeDocument/2006/customXml" ds:itemID="{D546C03B-CD3A-4EA0-AAA4-0E00E896454E}">
+  <ds:schemaRefs>
+    <ds:schemaRef ds:uri="http://schemas.microsoft.com/sharepoint/v3/contenttype/forms"/>
+  </ds:schemaRefs>
+</ds:datastoreItem>
 </file>
 
-<file path=customXml/itemProps1.xml><?xml version="1.0" encoding="utf-8"?>
+<file path=customXml/itemProps3.xml><?xml version="1.0" encoding="utf-8"?>
 <ds:datastoreItem xmlns:ds="http://schemas.openxmlformats.org/officeDocument/2006/customXml" ds:itemID="{66BA7D05-A425-4449-B909-FD98A040947D}">
   <ds:schemaRefs>
     <ds:schemaRef ds:uri="http://schemas.microsoft.com/office/2006/metadata/contentType"/>
@@ -10819,29 +10231,4 @@
     <ds:schemaRef ds:uri="http://schemas.microsoft.com/internal/obd"/>
   </ds:schemaRefs>
 </ds:datastoreItem>
-</file>
-
-<file path=customXml/itemProps2.xml><?xml version="1.0" encoding="utf-8"?>
-<ds:datastoreItem xmlns:ds="http://schemas.openxmlformats.org/officeDocument/2006/customXml" ds:itemID="{D546C03B-CD3A-4EA0-AAA4-0E00E896454E}">
-  <ds:schemaRefs>
-    <ds:schemaRef ds:uri="http://schemas.microsoft.com/sharepoint/v3/contenttype/forms"/>
-  </ds:schemaRefs>
-</ds:datastoreItem>
-</file>
-
-<file path=customXml/itemProps3.xml><?xml version="1.0" encoding="utf-8"?>
-<ds:datastoreItem xmlns:ds="http://schemas.openxmlformats.org/officeDocument/2006/customXml" ds:itemID="{DED4E12E-7268-4B03-A47B-0755D62B5E31}">
-  <ds:schemaRefs>
-    <ds:schemaRef ds:uri="http://schemas.microsoft.com/office/2006/documentManagement/types"/>
-    <ds:schemaRef ds:uri="http://purl.org/dc/elements/1.1/"/>
-    <ds:schemaRef ds:uri="http://purl.org/dc/dcmitype/"/>
-    <ds:schemaRef ds:uri="http://schemas.microsoft.com/office/infopath/2007/PartnerControls"/>
-    <ds:schemaRef ds:uri="http://schemas.microsoft.com/office/2006/metadata/properties"/>
-    <ds:schemaRef ds:uri="http://purl.org/dc/terms/"/>
-    <ds:schemaRef ds:uri="http://www.w3.org/XML/1998/namespace"/>
-    <ds:schemaRef ds:uri="http://schemas.openxmlformats.org/package/2006/metadata/core-properties"/>
-    <ds:schemaRef ds:uri="a915d5db-83f9-4a1c-939a-8e707aa4dcbb"/>
-    <ds:schemaRef ds:uri="23ce7308-0f1e-43e9-aba3-b9c7d7318f5c"/>
-  </ds:schemaRefs>
-</ds:datastoreItem>
 </file>
</xml_diff>